<commit_message>
make new imperial data
</commit_message>
<xml_diff>
--- a/docs/enterprise-budgets/timelines-visual.pptx
+++ b/docs/enterprise-budgets/timelines-visual.pptx
@@ -262,7 +262,7 @@
           <a:p>
             <a:fld id="{36776001-9B75-4AA6-8286-BD4E6E27ADA4}" type="datetimeFigureOut">
               <a:rPr lang="en-US" smtClean="0"/>
-              <a:t>3/30/2023</a:t>
+              <a:t>4/26/2023</a:t>
             </a:fld>
             <a:endParaRPr lang="en-US"/>
           </a:p>
@@ -460,7 +460,7 @@
           <a:p>
             <a:fld id="{36776001-9B75-4AA6-8286-BD4E6E27ADA4}" type="datetimeFigureOut">
               <a:rPr lang="en-US" smtClean="0"/>
-              <a:t>3/30/2023</a:t>
+              <a:t>4/26/2023</a:t>
             </a:fld>
             <a:endParaRPr lang="en-US"/>
           </a:p>
@@ -668,7 +668,7 @@
           <a:p>
             <a:fld id="{36776001-9B75-4AA6-8286-BD4E6E27ADA4}" type="datetimeFigureOut">
               <a:rPr lang="en-US" smtClean="0"/>
-              <a:t>3/30/2023</a:t>
+              <a:t>4/26/2023</a:t>
             </a:fld>
             <a:endParaRPr lang="en-US"/>
           </a:p>
@@ -866,7 +866,7 @@
           <a:p>
             <a:fld id="{36776001-9B75-4AA6-8286-BD4E6E27ADA4}" type="datetimeFigureOut">
               <a:rPr lang="en-US" smtClean="0"/>
-              <a:t>3/30/2023</a:t>
+              <a:t>4/26/2023</a:t>
             </a:fld>
             <a:endParaRPr lang="en-US"/>
           </a:p>
@@ -1141,7 +1141,7 @@
           <a:p>
             <a:fld id="{36776001-9B75-4AA6-8286-BD4E6E27ADA4}" type="datetimeFigureOut">
               <a:rPr lang="en-US" smtClean="0"/>
-              <a:t>3/30/2023</a:t>
+              <a:t>4/26/2023</a:t>
             </a:fld>
             <a:endParaRPr lang="en-US"/>
           </a:p>
@@ -1406,7 +1406,7 @@
           <a:p>
             <a:fld id="{36776001-9B75-4AA6-8286-BD4E6E27ADA4}" type="datetimeFigureOut">
               <a:rPr lang="en-US" smtClean="0"/>
-              <a:t>3/30/2023</a:t>
+              <a:t>4/26/2023</a:t>
             </a:fld>
             <a:endParaRPr lang="en-US"/>
           </a:p>
@@ -1818,7 +1818,7 @@
           <a:p>
             <a:fld id="{36776001-9B75-4AA6-8286-BD4E6E27ADA4}" type="datetimeFigureOut">
               <a:rPr lang="en-US" smtClean="0"/>
-              <a:t>3/30/2023</a:t>
+              <a:t>4/26/2023</a:t>
             </a:fld>
             <a:endParaRPr lang="en-US"/>
           </a:p>
@@ -1959,7 +1959,7 @@
           <a:p>
             <a:fld id="{36776001-9B75-4AA6-8286-BD4E6E27ADA4}" type="datetimeFigureOut">
               <a:rPr lang="en-US" smtClean="0"/>
-              <a:t>3/30/2023</a:t>
+              <a:t>4/26/2023</a:t>
             </a:fld>
             <a:endParaRPr lang="en-US"/>
           </a:p>
@@ -2072,7 +2072,7 @@
           <a:p>
             <a:fld id="{36776001-9B75-4AA6-8286-BD4E6E27ADA4}" type="datetimeFigureOut">
               <a:rPr lang="en-US" smtClean="0"/>
-              <a:t>3/30/2023</a:t>
+              <a:t>4/26/2023</a:t>
             </a:fld>
             <a:endParaRPr lang="en-US"/>
           </a:p>
@@ -2383,7 +2383,7 @@
           <a:p>
             <a:fld id="{36776001-9B75-4AA6-8286-BD4E6E27ADA4}" type="datetimeFigureOut">
               <a:rPr lang="en-US" smtClean="0"/>
-              <a:t>3/30/2023</a:t>
+              <a:t>4/26/2023</a:t>
             </a:fld>
             <a:endParaRPr lang="en-US"/>
           </a:p>
@@ -2671,7 +2671,7 @@
           <a:p>
             <a:fld id="{36776001-9B75-4AA6-8286-BD4E6E27ADA4}" type="datetimeFigureOut">
               <a:rPr lang="en-US" smtClean="0"/>
-              <a:t>3/30/2023</a:t>
+              <a:t>4/26/2023</a:t>
             </a:fld>
             <a:endParaRPr lang="en-US"/>
           </a:p>
@@ -2912,7 +2912,7 @@
           <a:p>
             <a:fld id="{36776001-9B75-4AA6-8286-BD4E6E27ADA4}" type="datetimeFigureOut">
               <a:rPr lang="en-US" smtClean="0"/>
-              <a:t>3/30/2023</a:t>
+              <a:t>4/26/2023</a:t>
             </a:fld>
             <a:endParaRPr lang="en-US"/>
           </a:p>
@@ -19421,522 +19421,6 @@
           </a:p>
         </p:txBody>
       </p:sp>
-      <p:sp>
-        <p:nvSpPr>
-          <p:cNvPr id="18" name="TextBox 17">
-            <a:extLst>
-              <a:ext uri="{FF2B5EF4-FFF2-40B4-BE49-F238E27FC236}">
-                <a16:creationId xmlns:a16="http://schemas.microsoft.com/office/drawing/2014/main" id="{A5E0F1F8-30AC-8320-1599-65EFFB6A8117}"/>
-              </a:ext>
-            </a:extLst>
-          </p:cNvPr>
-          <p:cNvSpPr txBox="1"/>
-          <p:nvPr/>
-        </p:nvSpPr>
-        <p:spPr>
-          <a:xfrm>
-            <a:off x="3488060" y="4549649"/>
-            <a:ext cx="457937" cy="276999"/>
-          </a:xfrm>
-          <a:prstGeom prst="rect">
-            <a:avLst/>
-          </a:prstGeom>
-          <a:solidFill>
-            <a:schemeClr val="accent4"/>
-          </a:solidFill>
-          <a:ln>
-            <a:solidFill>
-              <a:schemeClr val="tx1"/>
-            </a:solidFill>
-          </a:ln>
-        </p:spPr>
-        <p:txBody>
-          <a:bodyPr wrap="square" rtlCol="0">
-            <a:spAutoFit/>
-          </a:bodyPr>
-          <a:lstStyle/>
-          <a:p>
-            <a:pPr algn="ctr"/>
-            <a:r>
-              <a:rPr lang="en-US" sz="1200" dirty="0"/>
-              <a:t>Jan</a:t>
-            </a:r>
-          </a:p>
-        </p:txBody>
-      </p:sp>
-      <p:sp>
-        <p:nvSpPr>
-          <p:cNvPr id="19" name="TextBox 18">
-            <a:extLst>
-              <a:ext uri="{FF2B5EF4-FFF2-40B4-BE49-F238E27FC236}">
-                <a16:creationId xmlns:a16="http://schemas.microsoft.com/office/drawing/2014/main" id="{928CDBD9-9868-63FC-E1B7-518B36F8D4D0}"/>
-              </a:ext>
-            </a:extLst>
-          </p:cNvPr>
-          <p:cNvSpPr txBox="1"/>
-          <p:nvPr/>
-        </p:nvSpPr>
-        <p:spPr>
-          <a:xfrm>
-            <a:off x="3976067" y="4549649"/>
-            <a:ext cx="457937" cy="276999"/>
-          </a:xfrm>
-          <a:prstGeom prst="rect">
-            <a:avLst/>
-          </a:prstGeom>
-          <a:solidFill>
-            <a:schemeClr val="accent4"/>
-          </a:solidFill>
-          <a:ln>
-            <a:solidFill>
-              <a:schemeClr val="tx1"/>
-            </a:solidFill>
-          </a:ln>
-        </p:spPr>
-        <p:txBody>
-          <a:bodyPr wrap="square" rtlCol="0">
-            <a:spAutoFit/>
-          </a:bodyPr>
-          <a:lstStyle/>
-          <a:p>
-            <a:pPr algn="ctr"/>
-            <a:r>
-              <a:rPr lang="en-US" sz="1200" dirty="0"/>
-              <a:t>Feb</a:t>
-            </a:r>
-          </a:p>
-        </p:txBody>
-      </p:sp>
-      <p:sp>
-        <p:nvSpPr>
-          <p:cNvPr id="20" name="TextBox 19">
-            <a:extLst>
-              <a:ext uri="{FF2B5EF4-FFF2-40B4-BE49-F238E27FC236}">
-                <a16:creationId xmlns:a16="http://schemas.microsoft.com/office/drawing/2014/main" id="{E79D5B4B-1103-69F1-A9D1-7E6B900D551D}"/>
-              </a:ext>
-            </a:extLst>
-          </p:cNvPr>
-          <p:cNvSpPr txBox="1"/>
-          <p:nvPr/>
-        </p:nvSpPr>
-        <p:spPr>
-          <a:xfrm>
-            <a:off x="4464074" y="4549649"/>
-            <a:ext cx="457937" cy="276999"/>
-          </a:xfrm>
-          <a:prstGeom prst="rect">
-            <a:avLst/>
-          </a:prstGeom>
-          <a:solidFill>
-            <a:schemeClr val="accent4"/>
-          </a:solidFill>
-          <a:ln>
-            <a:solidFill>
-              <a:schemeClr val="tx1"/>
-            </a:solidFill>
-          </a:ln>
-        </p:spPr>
-        <p:txBody>
-          <a:bodyPr wrap="square" rtlCol="0">
-            <a:spAutoFit/>
-          </a:bodyPr>
-          <a:lstStyle/>
-          <a:p>
-            <a:pPr algn="ctr"/>
-            <a:r>
-              <a:rPr lang="en-US" sz="1200" dirty="0"/>
-              <a:t>Mar</a:t>
-            </a:r>
-          </a:p>
-        </p:txBody>
-      </p:sp>
-      <p:sp>
-        <p:nvSpPr>
-          <p:cNvPr id="21" name="TextBox 20">
-            <a:extLst>
-              <a:ext uri="{FF2B5EF4-FFF2-40B4-BE49-F238E27FC236}">
-                <a16:creationId xmlns:a16="http://schemas.microsoft.com/office/drawing/2014/main" id="{115FE97E-51FF-57A0-472D-CE70B991DFA1}"/>
-              </a:ext>
-            </a:extLst>
-          </p:cNvPr>
-          <p:cNvSpPr txBox="1"/>
-          <p:nvPr/>
-        </p:nvSpPr>
-        <p:spPr>
-          <a:xfrm>
-            <a:off x="4952081" y="4549649"/>
-            <a:ext cx="457937" cy="276999"/>
-          </a:xfrm>
-          <a:prstGeom prst="rect">
-            <a:avLst/>
-          </a:prstGeom>
-          <a:solidFill>
-            <a:schemeClr val="accent4"/>
-          </a:solidFill>
-          <a:ln>
-            <a:solidFill>
-              <a:schemeClr val="tx1"/>
-            </a:solidFill>
-          </a:ln>
-        </p:spPr>
-        <p:txBody>
-          <a:bodyPr wrap="square" rtlCol="0">
-            <a:spAutoFit/>
-          </a:bodyPr>
-          <a:lstStyle/>
-          <a:p>
-            <a:pPr algn="ctr"/>
-            <a:r>
-              <a:rPr lang="en-US" sz="1200" dirty="0"/>
-              <a:t>Apr</a:t>
-            </a:r>
-          </a:p>
-        </p:txBody>
-      </p:sp>
-      <p:sp>
-        <p:nvSpPr>
-          <p:cNvPr id="22" name="TextBox 21">
-            <a:extLst>
-              <a:ext uri="{FF2B5EF4-FFF2-40B4-BE49-F238E27FC236}">
-                <a16:creationId xmlns:a16="http://schemas.microsoft.com/office/drawing/2014/main" id="{B87CCC5B-D810-3AC5-E1B7-CDDDCCBFECC0}"/>
-              </a:ext>
-            </a:extLst>
-          </p:cNvPr>
-          <p:cNvSpPr txBox="1"/>
-          <p:nvPr/>
-        </p:nvSpPr>
-        <p:spPr>
-          <a:xfrm>
-            <a:off x="5440088" y="4549649"/>
-            <a:ext cx="457937" cy="276999"/>
-          </a:xfrm>
-          <a:prstGeom prst="rect">
-            <a:avLst/>
-          </a:prstGeom>
-          <a:solidFill>
-            <a:schemeClr val="accent4"/>
-          </a:solidFill>
-          <a:ln>
-            <a:solidFill>
-              <a:schemeClr val="tx1"/>
-            </a:solidFill>
-          </a:ln>
-        </p:spPr>
-        <p:txBody>
-          <a:bodyPr wrap="square" rtlCol="0">
-            <a:spAutoFit/>
-          </a:bodyPr>
-          <a:lstStyle/>
-          <a:p>
-            <a:pPr algn="ctr"/>
-            <a:r>
-              <a:rPr lang="en-US" sz="1200" dirty="0"/>
-              <a:t>May</a:t>
-            </a:r>
-          </a:p>
-        </p:txBody>
-      </p:sp>
-      <p:sp>
-        <p:nvSpPr>
-          <p:cNvPr id="23" name="TextBox 22">
-            <a:extLst>
-              <a:ext uri="{FF2B5EF4-FFF2-40B4-BE49-F238E27FC236}">
-                <a16:creationId xmlns:a16="http://schemas.microsoft.com/office/drawing/2014/main" id="{CBD62617-45A4-4C6D-748A-08757B702A44}"/>
-              </a:ext>
-            </a:extLst>
-          </p:cNvPr>
-          <p:cNvSpPr txBox="1"/>
-          <p:nvPr/>
-        </p:nvSpPr>
-        <p:spPr>
-          <a:xfrm>
-            <a:off x="5928095" y="4549649"/>
-            <a:ext cx="457937" cy="276999"/>
-          </a:xfrm>
-          <a:prstGeom prst="rect">
-            <a:avLst/>
-          </a:prstGeom>
-          <a:solidFill>
-            <a:schemeClr val="accent4"/>
-          </a:solidFill>
-          <a:ln>
-            <a:solidFill>
-              <a:schemeClr val="tx1"/>
-            </a:solidFill>
-          </a:ln>
-        </p:spPr>
-        <p:txBody>
-          <a:bodyPr wrap="square" rtlCol="0">
-            <a:spAutoFit/>
-          </a:bodyPr>
-          <a:lstStyle/>
-          <a:p>
-            <a:pPr algn="ctr"/>
-            <a:r>
-              <a:rPr lang="en-US" sz="1200" dirty="0"/>
-              <a:t>Jun</a:t>
-            </a:r>
-          </a:p>
-        </p:txBody>
-      </p:sp>
-      <p:sp>
-        <p:nvSpPr>
-          <p:cNvPr id="24" name="TextBox 23">
-            <a:extLst>
-              <a:ext uri="{FF2B5EF4-FFF2-40B4-BE49-F238E27FC236}">
-                <a16:creationId xmlns:a16="http://schemas.microsoft.com/office/drawing/2014/main" id="{E81A091D-D6A6-7A7C-773D-394F1A6895AE}"/>
-              </a:ext>
-            </a:extLst>
-          </p:cNvPr>
-          <p:cNvSpPr txBox="1"/>
-          <p:nvPr/>
-        </p:nvSpPr>
-        <p:spPr>
-          <a:xfrm>
-            <a:off x="6416102" y="4549649"/>
-            <a:ext cx="457937" cy="276999"/>
-          </a:xfrm>
-          <a:prstGeom prst="rect">
-            <a:avLst/>
-          </a:prstGeom>
-          <a:solidFill>
-            <a:schemeClr val="accent4"/>
-          </a:solidFill>
-          <a:ln>
-            <a:solidFill>
-              <a:schemeClr val="tx1"/>
-            </a:solidFill>
-          </a:ln>
-        </p:spPr>
-        <p:txBody>
-          <a:bodyPr wrap="square" rtlCol="0">
-            <a:spAutoFit/>
-          </a:bodyPr>
-          <a:lstStyle/>
-          <a:p>
-            <a:pPr algn="ctr"/>
-            <a:r>
-              <a:rPr lang="en-US" sz="1200" dirty="0"/>
-              <a:t>Jul</a:t>
-            </a:r>
-          </a:p>
-        </p:txBody>
-      </p:sp>
-      <p:sp>
-        <p:nvSpPr>
-          <p:cNvPr id="25" name="TextBox 24">
-            <a:extLst>
-              <a:ext uri="{FF2B5EF4-FFF2-40B4-BE49-F238E27FC236}">
-                <a16:creationId xmlns:a16="http://schemas.microsoft.com/office/drawing/2014/main" id="{41118020-B733-7E61-0E64-F8AC0536E42F}"/>
-              </a:ext>
-            </a:extLst>
-          </p:cNvPr>
-          <p:cNvSpPr txBox="1"/>
-          <p:nvPr/>
-        </p:nvSpPr>
-        <p:spPr>
-          <a:xfrm>
-            <a:off x="6904109" y="4549649"/>
-            <a:ext cx="457937" cy="276999"/>
-          </a:xfrm>
-          <a:prstGeom prst="rect">
-            <a:avLst/>
-          </a:prstGeom>
-          <a:solidFill>
-            <a:schemeClr val="accent4"/>
-          </a:solidFill>
-          <a:ln>
-            <a:solidFill>
-              <a:schemeClr val="tx1"/>
-            </a:solidFill>
-          </a:ln>
-        </p:spPr>
-        <p:txBody>
-          <a:bodyPr wrap="square" rtlCol="0">
-            <a:spAutoFit/>
-          </a:bodyPr>
-          <a:lstStyle/>
-          <a:p>
-            <a:pPr algn="ctr"/>
-            <a:r>
-              <a:rPr lang="en-US" sz="1200" dirty="0"/>
-              <a:t>Aug</a:t>
-            </a:r>
-          </a:p>
-        </p:txBody>
-      </p:sp>
-      <p:sp>
-        <p:nvSpPr>
-          <p:cNvPr id="26" name="TextBox 25">
-            <a:extLst>
-              <a:ext uri="{FF2B5EF4-FFF2-40B4-BE49-F238E27FC236}">
-                <a16:creationId xmlns:a16="http://schemas.microsoft.com/office/drawing/2014/main" id="{BA3121E5-6093-D1F1-9DF9-E3E494B38CCA}"/>
-              </a:ext>
-            </a:extLst>
-          </p:cNvPr>
-          <p:cNvSpPr txBox="1"/>
-          <p:nvPr/>
-        </p:nvSpPr>
-        <p:spPr>
-          <a:xfrm>
-            <a:off x="7392116" y="4549649"/>
-            <a:ext cx="457937" cy="276999"/>
-          </a:xfrm>
-          <a:prstGeom prst="rect">
-            <a:avLst/>
-          </a:prstGeom>
-          <a:solidFill>
-            <a:schemeClr val="accent4"/>
-          </a:solidFill>
-          <a:ln>
-            <a:solidFill>
-              <a:schemeClr val="tx1"/>
-            </a:solidFill>
-          </a:ln>
-        </p:spPr>
-        <p:txBody>
-          <a:bodyPr wrap="square" rtlCol="0">
-            <a:spAutoFit/>
-          </a:bodyPr>
-          <a:lstStyle/>
-          <a:p>
-            <a:pPr algn="ctr"/>
-            <a:r>
-              <a:rPr lang="en-US" sz="1200" dirty="0"/>
-              <a:t>Sep</a:t>
-            </a:r>
-          </a:p>
-        </p:txBody>
-      </p:sp>
-      <p:sp>
-        <p:nvSpPr>
-          <p:cNvPr id="27" name="TextBox 26">
-            <a:extLst>
-              <a:ext uri="{FF2B5EF4-FFF2-40B4-BE49-F238E27FC236}">
-                <a16:creationId xmlns:a16="http://schemas.microsoft.com/office/drawing/2014/main" id="{3B3C02C5-01F9-91C8-6E85-C6870EA8486F}"/>
-              </a:ext>
-            </a:extLst>
-          </p:cNvPr>
-          <p:cNvSpPr txBox="1"/>
-          <p:nvPr/>
-        </p:nvSpPr>
-        <p:spPr>
-          <a:xfrm>
-            <a:off x="7880123" y="4549649"/>
-            <a:ext cx="457937" cy="276999"/>
-          </a:xfrm>
-          <a:prstGeom prst="rect">
-            <a:avLst/>
-          </a:prstGeom>
-          <a:solidFill>
-            <a:schemeClr val="accent4"/>
-          </a:solidFill>
-          <a:ln>
-            <a:solidFill>
-              <a:schemeClr val="tx1"/>
-            </a:solidFill>
-          </a:ln>
-        </p:spPr>
-        <p:txBody>
-          <a:bodyPr wrap="square" rtlCol="0">
-            <a:spAutoFit/>
-          </a:bodyPr>
-          <a:lstStyle/>
-          <a:p>
-            <a:pPr algn="ctr"/>
-            <a:r>
-              <a:rPr lang="en-US" sz="1200" dirty="0"/>
-              <a:t>Oct</a:t>
-            </a:r>
-          </a:p>
-        </p:txBody>
-      </p:sp>
-      <p:sp>
-        <p:nvSpPr>
-          <p:cNvPr id="28" name="TextBox 27">
-            <a:extLst>
-              <a:ext uri="{FF2B5EF4-FFF2-40B4-BE49-F238E27FC236}">
-                <a16:creationId xmlns:a16="http://schemas.microsoft.com/office/drawing/2014/main" id="{DF8DBB59-7EB0-D280-FDD0-A11708A34C5E}"/>
-              </a:ext>
-            </a:extLst>
-          </p:cNvPr>
-          <p:cNvSpPr txBox="1"/>
-          <p:nvPr/>
-        </p:nvSpPr>
-        <p:spPr>
-          <a:xfrm>
-            <a:off x="8368130" y="4549649"/>
-            <a:ext cx="457937" cy="276999"/>
-          </a:xfrm>
-          <a:prstGeom prst="rect">
-            <a:avLst/>
-          </a:prstGeom>
-          <a:solidFill>
-            <a:schemeClr val="accent4"/>
-          </a:solidFill>
-          <a:ln>
-            <a:solidFill>
-              <a:schemeClr val="tx1"/>
-            </a:solidFill>
-          </a:ln>
-        </p:spPr>
-        <p:txBody>
-          <a:bodyPr wrap="square" rtlCol="0">
-            <a:spAutoFit/>
-          </a:bodyPr>
-          <a:lstStyle/>
-          <a:p>
-            <a:pPr algn="ctr"/>
-            <a:r>
-              <a:rPr lang="en-US" sz="1200" dirty="0"/>
-              <a:t>Nov</a:t>
-            </a:r>
-          </a:p>
-        </p:txBody>
-      </p:sp>
-      <p:sp>
-        <p:nvSpPr>
-          <p:cNvPr id="29" name="TextBox 28">
-            <a:extLst>
-              <a:ext uri="{FF2B5EF4-FFF2-40B4-BE49-F238E27FC236}">
-                <a16:creationId xmlns:a16="http://schemas.microsoft.com/office/drawing/2014/main" id="{78286D53-A7D6-FEBE-1953-0F8B591E41B4}"/>
-              </a:ext>
-            </a:extLst>
-          </p:cNvPr>
-          <p:cNvSpPr txBox="1"/>
-          <p:nvPr/>
-        </p:nvSpPr>
-        <p:spPr>
-          <a:xfrm>
-            <a:off x="8856136" y="4549649"/>
-            <a:ext cx="457937" cy="276999"/>
-          </a:xfrm>
-          <a:prstGeom prst="rect">
-            <a:avLst/>
-          </a:prstGeom>
-          <a:solidFill>
-            <a:schemeClr val="accent4"/>
-          </a:solidFill>
-          <a:ln>
-            <a:solidFill>
-              <a:schemeClr val="tx1"/>
-            </a:solidFill>
-          </a:ln>
-        </p:spPr>
-        <p:txBody>
-          <a:bodyPr wrap="square" rtlCol="0">
-            <a:spAutoFit/>
-          </a:bodyPr>
-          <a:lstStyle/>
-          <a:p>
-            <a:pPr algn="ctr"/>
-            <a:r>
-              <a:rPr lang="en-US" sz="1200" dirty="0"/>
-              <a:t>Dec</a:t>
-            </a:r>
-          </a:p>
-        </p:txBody>
-      </p:sp>
       <p:grpSp>
         <p:nvGrpSpPr>
           <p:cNvPr id="3" name="Group 2">
@@ -19951,7 +19435,7 @@
         </p:nvGrpSpPr>
         <p:grpSpPr>
           <a:xfrm>
-            <a:off x="4108827" y="5300186"/>
+            <a:off x="4078757" y="4913582"/>
             <a:ext cx="5826013" cy="276999"/>
             <a:chOff x="4922010" y="6329802"/>
             <a:chExt cx="5826013" cy="276999"/>
@@ -20567,7 +20051,7 @@
         </p:nvSpPr>
         <p:spPr>
           <a:xfrm>
-            <a:off x="77466" y="1089701"/>
+            <a:off x="110473" y="735515"/>
             <a:ext cx="335348" cy="200055"/>
           </a:xfrm>
           <a:prstGeom prst="rect">
@@ -20607,8 +20091,8 @@
         </p:nvSpPr>
         <p:spPr>
           <a:xfrm>
-            <a:off x="111022" y="1320397"/>
-            <a:ext cx="335348" cy="200055"/>
+            <a:off x="144029" y="966211"/>
+            <a:ext cx="599844" cy="200055"/>
           </a:xfrm>
           <a:prstGeom prst="rect">
             <a:avLst/>
@@ -20628,7 +20112,7 @@
           <a:p>
             <a:r>
               <a:rPr lang="en-US" sz="700" dirty="0"/>
-              <a:t>Disk</a:t>
+              <a:t>Triplane (?)</a:t>
             </a:r>
           </a:p>
         </p:txBody>
@@ -20647,8 +20131,8 @@
         </p:nvSpPr>
         <p:spPr>
           <a:xfrm>
-            <a:off x="144578" y="1551093"/>
-            <a:ext cx="373820" cy="200055"/>
+            <a:off x="177585" y="1196907"/>
+            <a:ext cx="636713" cy="200055"/>
           </a:xfrm>
           <a:prstGeom prst="rect">
             <a:avLst/>
@@ -20667,8 +20151,12 @@
           <a:lstStyle/>
           <a:p>
             <a:r>
+              <a:rPr lang="en-US" sz="700" dirty="0" err="1"/>
+              <a:t>Corugate</a:t>
+            </a:r>
+            <a:r>
               <a:rPr lang="en-US" sz="700" dirty="0"/>
-              <a:t>Level</a:t>
+              <a:t> (?)</a:t>
             </a:r>
           </a:p>
         </p:txBody>
@@ -20687,8 +20175,8 @@
         </p:nvSpPr>
         <p:spPr>
           <a:xfrm>
-            <a:off x="186523" y="1781789"/>
-            <a:ext cx="373820" cy="200055"/>
+            <a:off x="219530" y="1427603"/>
+            <a:ext cx="1055097" cy="200055"/>
           </a:xfrm>
           <a:prstGeom prst="rect">
             <a:avLst/>
@@ -20708,7 +20196,7 @@
           <a:p>
             <a:r>
               <a:rPr lang="en-US" sz="700" dirty="0"/>
-              <a:t>Level</a:t>
+              <a:t>Flood irrigation (1 ac-ft)</a:t>
             </a:r>
           </a:p>
         </p:txBody>
@@ -20770,8 +20258,8 @@
         </p:nvSpPr>
         <p:spPr>
           <a:xfrm>
-            <a:off x="220079" y="2012485"/>
-            <a:ext cx="373820" cy="200055"/>
+            <a:off x="253086" y="1658299"/>
+            <a:ext cx="335348" cy="200055"/>
           </a:xfrm>
           <a:prstGeom prst="rect">
             <a:avLst/>
@@ -20791,7 +20279,7 @@
           <a:p>
             <a:r>
               <a:rPr lang="en-US" sz="700" dirty="0"/>
-              <a:t>Level</a:t>
+              <a:t>Disk</a:t>
             </a:r>
           </a:p>
         </p:txBody>
@@ -20810,8 +20298,8 @@
         </p:nvSpPr>
         <p:spPr>
           <a:xfrm>
-            <a:off x="253635" y="2243181"/>
-            <a:ext cx="1316386" cy="307777"/>
+            <a:off x="286642" y="1888995"/>
+            <a:ext cx="1109599" cy="200055"/>
           </a:xfrm>
           <a:prstGeom prst="rect">
             <a:avLst/>
@@ -20831,21 +20319,15 @@
           <a:p>
             <a:r>
               <a:rPr lang="en-US" sz="700" dirty="0"/>
-              <a:t>Spread fertilizer </a:t>
-            </a:r>
-          </a:p>
-          <a:p>
+              <a:t>Fertilize (300 </a:t>
+            </a:r>
+            <a:r>
+              <a:rPr lang="en-US" sz="700" dirty="0" err="1"/>
+              <a:t>lbs</a:t>
+            </a:r>
             <a:r>
               <a:rPr lang="en-US" sz="700" dirty="0"/>
-              <a:t>(MAP, S, sodium </a:t>
-            </a:r>
-            <a:r>
-              <a:rPr lang="en-US" sz="700" dirty="0" err="1"/>
-              <a:t>molybdenate</a:t>
-            </a:r>
-            <a:r>
-              <a:rPr lang="en-US" sz="700" dirty="0"/>
-              <a:t>)</a:t>
+              <a:t> 11-52-0)</a:t>
             </a:r>
           </a:p>
         </p:txBody>
@@ -20864,7 +20346,7 @@
         </p:nvSpPr>
         <p:spPr>
           <a:xfrm>
-            <a:off x="299530" y="2604062"/>
+            <a:off x="352436" y="2125411"/>
             <a:ext cx="335348" cy="200055"/>
           </a:xfrm>
           <a:prstGeom prst="rect">
@@ -20904,7 +20386,7 @@
         </p:nvSpPr>
         <p:spPr>
           <a:xfrm>
-            <a:off x="38102" y="845427"/>
+            <a:off x="71109" y="491241"/>
             <a:ext cx="898003" cy="200055"/>
           </a:xfrm>
           <a:prstGeom prst="rect">
@@ -20972,245 +20454,6 @@
       </p:sp>
       <p:sp>
         <p:nvSpPr>
-          <p:cNvPr id="72" name="TextBox 71">
-            <a:extLst>
-              <a:ext uri="{FF2B5EF4-FFF2-40B4-BE49-F238E27FC236}">
-                <a16:creationId xmlns:a16="http://schemas.microsoft.com/office/drawing/2014/main" id="{E22F0C22-2ECC-0F07-0281-BFFA4ABA7D60}"/>
-              </a:ext>
-            </a:extLst>
-          </p:cNvPr>
-          <p:cNvSpPr txBox="1"/>
-          <p:nvPr/>
-        </p:nvSpPr>
-        <p:spPr>
-          <a:xfrm>
-            <a:off x="3039336" y="2466457"/>
-            <a:ext cx="830677" cy="200055"/>
-          </a:xfrm>
-          <a:prstGeom prst="rect">
-            <a:avLst/>
-          </a:prstGeom>
-          <a:solidFill>
-            <a:schemeClr val="bg2"/>
-          </a:solidFill>
-          <a:ln>
-            <a:solidFill>
-              <a:schemeClr val="tx1"/>
-            </a:solidFill>
-          </a:ln>
-        </p:spPr>
-        <p:txBody>
-          <a:bodyPr wrap="none" rtlCol="0">
-            <a:spAutoFit/>
-          </a:bodyPr>
-          <a:lstStyle/>
-          <a:p>
-            <a:r>
-              <a:rPr lang="en-US" sz="700" dirty="0"/>
-              <a:t>Raptor, </a:t>
-            </a:r>
-            <a:r>
-              <a:rPr lang="en-US" sz="700" dirty="0" err="1"/>
-              <a:t>Herbimax</a:t>
-            </a:r>
-            <a:endParaRPr lang="en-US" sz="700" dirty="0"/>
-          </a:p>
-        </p:txBody>
-      </p:sp>
-      <p:grpSp>
-        <p:nvGrpSpPr>
-          <p:cNvPr id="79" name="Group 78">
-            <a:extLst>
-              <a:ext uri="{FF2B5EF4-FFF2-40B4-BE49-F238E27FC236}">
-                <a16:creationId xmlns:a16="http://schemas.microsoft.com/office/drawing/2014/main" id="{C3F2CCED-E755-6974-0E65-202A9BF82046}"/>
-              </a:ext>
-            </a:extLst>
-          </p:cNvPr>
-          <p:cNvGrpSpPr/>
-          <p:nvPr/>
-        </p:nvGrpSpPr>
-        <p:grpSpPr>
-          <a:xfrm>
-            <a:off x="4702890" y="3106884"/>
-            <a:ext cx="549638" cy="799744"/>
-            <a:chOff x="4702890" y="3106884"/>
-            <a:chExt cx="549638" cy="799744"/>
-          </a:xfrm>
-        </p:grpSpPr>
-        <p:sp>
-          <p:nvSpPr>
-            <p:cNvPr id="131" name="TextBox 130">
-              <a:extLst>
-                <a:ext uri="{FF2B5EF4-FFF2-40B4-BE49-F238E27FC236}">
-                  <a16:creationId xmlns:a16="http://schemas.microsoft.com/office/drawing/2014/main" id="{6E7AE674-CECA-0107-A620-91544F7C886A}"/>
-                </a:ext>
-              </a:extLst>
-            </p:cNvPr>
-            <p:cNvSpPr txBox="1"/>
-            <p:nvPr/>
-          </p:nvSpPr>
-          <p:spPr>
-            <a:xfrm>
-              <a:off x="4702890" y="3106884"/>
-              <a:ext cx="410689" cy="200055"/>
-            </a:xfrm>
-            <a:prstGeom prst="rect">
-              <a:avLst/>
-            </a:prstGeom>
-            <a:solidFill>
-              <a:schemeClr val="bg1"/>
-            </a:solidFill>
-            <a:ln>
-              <a:solidFill>
-                <a:schemeClr val="tx1"/>
-              </a:solidFill>
-            </a:ln>
-          </p:spPr>
-          <p:txBody>
-            <a:bodyPr wrap="none" rtlCol="0" anchor="ctr">
-              <a:spAutoFit/>
-            </a:bodyPr>
-            <a:lstStyle/>
-            <a:p>
-              <a:pPr algn="ctr"/>
-              <a:r>
-                <a:rPr lang="en-US" sz="700" dirty="0"/>
-                <a:t>Swath</a:t>
-              </a:r>
-            </a:p>
-          </p:txBody>
-        </p:sp>
-        <p:sp>
-          <p:nvSpPr>
-            <p:cNvPr id="132" name="TextBox 131">
-              <a:extLst>
-                <a:ext uri="{FF2B5EF4-FFF2-40B4-BE49-F238E27FC236}">
-                  <a16:creationId xmlns:a16="http://schemas.microsoft.com/office/drawing/2014/main" id="{4D3C5980-5B24-1F25-C16A-D2EED821C9DB}"/>
-                </a:ext>
-              </a:extLst>
-            </p:cNvPr>
-            <p:cNvSpPr txBox="1"/>
-            <p:nvPr/>
-          </p:nvSpPr>
-          <p:spPr>
-            <a:xfrm>
-              <a:off x="4702890" y="3310264"/>
-              <a:ext cx="378629" cy="200055"/>
-            </a:xfrm>
-            <a:prstGeom prst="rect">
-              <a:avLst/>
-            </a:prstGeom>
-            <a:solidFill>
-              <a:schemeClr val="bg1"/>
-            </a:solidFill>
-            <a:ln>
-              <a:solidFill>
-                <a:schemeClr val="tx1"/>
-              </a:solidFill>
-            </a:ln>
-          </p:spPr>
-          <p:txBody>
-            <a:bodyPr wrap="square" rtlCol="0" anchor="ctr">
-              <a:spAutoFit/>
-            </a:bodyPr>
-            <a:lstStyle/>
-            <a:p>
-              <a:pPr algn="ctr"/>
-              <a:r>
-                <a:rPr lang="en-US" sz="700" dirty="0"/>
-                <a:t>Rake</a:t>
-              </a:r>
-            </a:p>
-          </p:txBody>
-        </p:sp>
-        <p:sp>
-          <p:nvSpPr>
-            <p:cNvPr id="133" name="TextBox 132">
-              <a:extLst>
-                <a:ext uri="{FF2B5EF4-FFF2-40B4-BE49-F238E27FC236}">
-                  <a16:creationId xmlns:a16="http://schemas.microsoft.com/office/drawing/2014/main" id="{59F7F05A-F6EE-4C55-62C8-8C5BB219B862}"/>
-                </a:ext>
-              </a:extLst>
-            </p:cNvPr>
-            <p:cNvSpPr txBox="1"/>
-            <p:nvPr/>
-          </p:nvSpPr>
-          <p:spPr>
-            <a:xfrm>
-              <a:off x="4702890" y="3511414"/>
-              <a:ext cx="341760" cy="200055"/>
-            </a:xfrm>
-            <a:prstGeom prst="rect">
-              <a:avLst/>
-            </a:prstGeom>
-            <a:solidFill>
-              <a:schemeClr val="bg1"/>
-            </a:solidFill>
-            <a:ln>
-              <a:solidFill>
-                <a:schemeClr val="tx1"/>
-              </a:solidFill>
-            </a:ln>
-          </p:spPr>
-          <p:txBody>
-            <a:bodyPr wrap="none" rtlCol="0" anchor="ctr">
-              <a:spAutoFit/>
-            </a:bodyPr>
-            <a:lstStyle/>
-            <a:p>
-              <a:pPr algn="ctr"/>
-              <a:r>
-                <a:rPr lang="en-US" sz="700" dirty="0"/>
-                <a:t>Bale</a:t>
-              </a:r>
-            </a:p>
-          </p:txBody>
-        </p:sp>
-        <p:sp>
-          <p:nvSpPr>
-            <p:cNvPr id="134" name="TextBox 133">
-              <a:extLst>
-                <a:ext uri="{FF2B5EF4-FFF2-40B4-BE49-F238E27FC236}">
-                  <a16:creationId xmlns:a16="http://schemas.microsoft.com/office/drawing/2014/main" id="{655B27E2-9981-8A91-7C25-6D5CA745BFF2}"/>
-                </a:ext>
-              </a:extLst>
-            </p:cNvPr>
-            <p:cNvSpPr txBox="1"/>
-            <p:nvPr/>
-          </p:nvSpPr>
-          <p:spPr>
-            <a:xfrm>
-              <a:off x="4702890" y="3706573"/>
-              <a:ext cx="549638" cy="200055"/>
-            </a:xfrm>
-            <a:prstGeom prst="rect">
-              <a:avLst/>
-            </a:prstGeom>
-            <a:solidFill>
-              <a:schemeClr val="bg1"/>
-            </a:solidFill>
-            <a:ln>
-              <a:solidFill>
-                <a:schemeClr val="tx1"/>
-              </a:solidFill>
-            </a:ln>
-          </p:spPr>
-          <p:txBody>
-            <a:bodyPr wrap="square" rtlCol="0" anchor="ctr">
-              <a:spAutoFit/>
-            </a:bodyPr>
-            <a:lstStyle/>
-            <a:p>
-              <a:r>
-                <a:rPr lang="en-US" sz="700" dirty="0"/>
-                <a:t>Roadside</a:t>
-              </a:r>
-            </a:p>
-          </p:txBody>
-        </p:sp>
-      </p:grpSp>
-      <p:sp>
-        <p:nvSpPr>
           <p:cNvPr id="144" name="TextBox 143">
             <a:extLst>
               <a:ext uri="{FF2B5EF4-FFF2-40B4-BE49-F238E27FC236}">
@@ -21223,7 +20466,7 @@
         </p:nvSpPr>
         <p:spPr>
           <a:xfrm>
-            <a:off x="8734679" y="3373113"/>
+            <a:off x="9448902" y="3384265"/>
             <a:ext cx="1011815" cy="230832"/>
           </a:xfrm>
           <a:prstGeom prst="rect">
@@ -21248,7 +20491,7 @@
                   <a:srgbClr val="FF0000"/>
                 </a:solidFill>
               </a:rPr>
-              <a:t>6 tons (90% DM?)</a:t>
+              <a:t>8 tons (90% DM?)</a:t>
             </a:r>
           </a:p>
         </p:txBody>
@@ -21268,7 +20511,7 @@
         <p:spPr>
           <a:xfrm>
             <a:off x="8423681" y="118117"/>
-            <a:ext cx="2400594" cy="369332"/>
+            <a:ext cx="1681358" cy="369332"/>
           </a:xfrm>
           <a:prstGeom prst="rect">
             <a:avLst/>
@@ -21283,7 +20526,7 @@
           <a:p>
             <a:r>
               <a:rPr lang="en-US" dirty="0"/>
-              <a:t>Intermountain, Siskiyou</a:t>
+              <a:t>Imperial County</a:t>
             </a:r>
           </a:p>
         </p:txBody>
@@ -21302,8 +20545,8 @@
         </p:nvSpPr>
         <p:spPr>
           <a:xfrm>
-            <a:off x="-14058" y="6391357"/>
-            <a:ext cx="3820277" cy="430887"/>
+            <a:off x="22577" y="6509382"/>
+            <a:ext cx="5367175" cy="261610"/>
           </a:xfrm>
           <a:prstGeom prst="rect">
             <a:avLst/>
@@ -21318,13 +20561,7 @@
           <a:p>
             <a:r>
               <a:rPr lang="en-US" sz="1100" dirty="0"/>
-              <a:t>Derived from 2020 Enterprise budgets</a:t>
-            </a:r>
-          </a:p>
-          <a:p>
-            <a:r>
-              <a:rPr lang="en-US" sz="1100" dirty="0"/>
-              <a:t>https://coststudies.ucdavis.edu/en/current/commodity/alfalfa/</a:t>
+              <a:t>Derived from 2023 Enterprise budgets received from Ali Montazar (amontazar@ucanr.edu)</a:t>
             </a:r>
           </a:p>
         </p:txBody>
@@ -21344,7 +20581,7 @@
         <p:spPr>
           <a:xfrm>
             <a:off x="8407953" y="503864"/>
-            <a:ext cx="2270173" cy="261610"/>
+            <a:ext cx="3058851" cy="769441"/>
           </a:xfrm>
           <a:prstGeom prst="rect">
             <a:avLst/>
@@ -21359,7 +20596,25 @@
           <a:p>
             <a:r>
               <a:rPr lang="en-US" sz="1100" i="1" dirty="0"/>
-              <a:t>Italics indicate an optional operation</a:t>
+              <a:t>I need the types of chemicals and amounts applied</a:t>
+            </a:r>
+          </a:p>
+          <a:p>
+            <a:r>
+              <a:rPr lang="en-US" sz="1100" i="1" dirty="0"/>
+              <a:t>Help with harvests</a:t>
+            </a:r>
+          </a:p>
+          <a:p>
+            <a:r>
+              <a:rPr lang="en-US" sz="1100" i="1" dirty="0"/>
+              <a:t>Help understanding land prep</a:t>
+            </a:r>
+          </a:p>
+          <a:p>
+            <a:r>
+              <a:rPr lang="en-US" sz="1100" i="1" dirty="0"/>
+              <a:t>Fuel used in airplanes?</a:t>
             </a:r>
           </a:p>
         </p:txBody>
@@ -21421,7 +20676,7 @@
         </p:nvGrpSpPr>
         <p:grpSpPr>
           <a:xfrm>
-            <a:off x="3728749" y="4921572"/>
+            <a:off x="3698679" y="4534968"/>
             <a:ext cx="5826013" cy="276999"/>
             <a:chOff x="4922010" y="6329802"/>
             <a:chExt cx="5826013" cy="276999"/>
@@ -21938,7 +21193,7 @@
         <p:spPr>
           <a:xfrm>
             <a:off x="1836505" y="1665323"/>
-            <a:ext cx="867545" cy="200055"/>
+            <a:ext cx="780983" cy="200055"/>
           </a:xfrm>
           <a:prstGeom prst="rect">
             <a:avLst/>
@@ -21958,7 +21213,7 @@
           <a:p>
             <a:r>
               <a:rPr lang="en-US" sz="700" dirty="0"/>
-              <a:t>Sprinkler irrigation</a:t>
+              <a:t>Flood irrigate 5x</a:t>
             </a:r>
           </a:p>
         </p:txBody>
@@ -22002,17 +21257,311 @@
                   <a:srgbClr val="FF0000"/>
                 </a:solidFill>
               </a:rPr>
-              <a:t>24 ac-in applied per year</a:t>
+              <a:t>84 ac-in applied per year</a:t>
+            </a:r>
+          </a:p>
+        </p:txBody>
+      </p:sp>
+      <p:sp>
+        <p:nvSpPr>
+          <p:cNvPr id="70" name="TextBox 69">
+            <a:extLst>
+              <a:ext uri="{FF2B5EF4-FFF2-40B4-BE49-F238E27FC236}">
+                <a16:creationId xmlns:a16="http://schemas.microsoft.com/office/drawing/2014/main" id="{6DCF2481-43B7-634F-DBA8-30308965AD79}"/>
+              </a:ext>
+            </a:extLst>
+          </p:cNvPr>
+          <p:cNvSpPr txBox="1"/>
+          <p:nvPr/>
+        </p:nvSpPr>
+        <p:spPr>
+          <a:xfrm>
+            <a:off x="1462989" y="943716"/>
+            <a:ext cx="1685077" cy="369332"/>
+          </a:xfrm>
+          <a:prstGeom prst="rect">
+            <a:avLst/>
+          </a:prstGeom>
+          <a:noFill/>
+          <a:ln>
+            <a:solidFill>
+              <a:schemeClr val="bg1"/>
+            </a:solidFill>
+          </a:ln>
+        </p:spPr>
+        <p:txBody>
+          <a:bodyPr wrap="none" rtlCol="0">
+            <a:spAutoFit/>
+          </a:bodyPr>
+          <a:lstStyle/>
+          <a:p>
+            <a:r>
+              <a:rPr lang="en-US" sz="900" i="1" dirty="0">
+                <a:solidFill>
+                  <a:srgbClr val="FF0000"/>
+                </a:solidFill>
+              </a:rPr>
+              <a:t>Five irrigations totaling 1.5 ac-ft</a:t>
+            </a:r>
+          </a:p>
+          <a:p>
+            <a:r>
+              <a:rPr lang="en-US" sz="900" i="1" dirty="0">
+                <a:solidFill>
+                  <a:srgbClr val="FF0000"/>
+                </a:solidFill>
+              </a:rPr>
+              <a:t>Gravity fed flood, everything</a:t>
+            </a:r>
+          </a:p>
+        </p:txBody>
+      </p:sp>
+      <p:sp>
+        <p:nvSpPr>
+          <p:cNvPr id="63" name="TextBox 62">
+            <a:extLst>
+              <a:ext uri="{FF2B5EF4-FFF2-40B4-BE49-F238E27FC236}">
+                <a16:creationId xmlns:a16="http://schemas.microsoft.com/office/drawing/2014/main" id="{7D4E02ED-6B18-5CAB-5FA2-A07675A1D9EA}"/>
+              </a:ext>
+            </a:extLst>
+          </p:cNvPr>
+          <p:cNvSpPr txBox="1"/>
+          <p:nvPr/>
+        </p:nvSpPr>
+        <p:spPr>
+          <a:xfrm>
+            <a:off x="46832" y="246967"/>
+            <a:ext cx="681597" cy="200055"/>
+          </a:xfrm>
+          <a:prstGeom prst="rect">
+            <a:avLst/>
+          </a:prstGeom>
+          <a:noFill/>
+          <a:ln>
+            <a:solidFill>
+              <a:schemeClr val="tx1"/>
+            </a:solidFill>
+          </a:ln>
+        </p:spPr>
+        <p:txBody>
+          <a:bodyPr wrap="none" rtlCol="0">
+            <a:spAutoFit/>
+          </a:bodyPr>
+          <a:lstStyle/>
+          <a:p>
+            <a:r>
+              <a:rPr lang="en-US" sz="700" dirty="0"/>
+              <a:t>Disk (stubble)</a:t>
+            </a:r>
+          </a:p>
+        </p:txBody>
+      </p:sp>
+      <p:sp>
+        <p:nvSpPr>
+          <p:cNvPr id="64" name="TextBox 63">
+            <a:extLst>
+              <a:ext uri="{FF2B5EF4-FFF2-40B4-BE49-F238E27FC236}">
+                <a16:creationId xmlns:a16="http://schemas.microsoft.com/office/drawing/2014/main" id="{E40C8614-CBFA-B33E-E6B3-56BAB632BAC7}"/>
+              </a:ext>
+            </a:extLst>
+          </p:cNvPr>
+          <p:cNvSpPr txBox="1"/>
+          <p:nvPr/>
+        </p:nvSpPr>
+        <p:spPr>
+          <a:xfrm>
+            <a:off x="446722" y="2351696"/>
+            <a:ext cx="482824" cy="200055"/>
+          </a:xfrm>
+          <a:prstGeom prst="rect">
+            <a:avLst/>
+          </a:prstGeom>
+          <a:noFill/>
+          <a:ln>
+            <a:solidFill>
+              <a:schemeClr val="tx1"/>
+            </a:solidFill>
+          </a:ln>
+        </p:spPr>
+        <p:txBody>
+          <a:bodyPr wrap="none" rtlCol="0">
+            <a:spAutoFit/>
+          </a:bodyPr>
+          <a:lstStyle/>
+          <a:p>
+            <a:r>
+              <a:rPr lang="en-US" sz="700" dirty="0"/>
+              <a:t>Triplane</a:t>
+            </a:r>
+          </a:p>
+        </p:txBody>
+      </p:sp>
+      <p:sp>
+        <p:nvSpPr>
+          <p:cNvPr id="66" name="TextBox 65">
+            <a:extLst>
+              <a:ext uri="{FF2B5EF4-FFF2-40B4-BE49-F238E27FC236}">
+                <a16:creationId xmlns:a16="http://schemas.microsoft.com/office/drawing/2014/main" id="{C02D79A8-947B-9FA7-51C1-BA77B44E87DA}"/>
+              </a:ext>
+            </a:extLst>
+          </p:cNvPr>
+          <p:cNvSpPr txBox="1"/>
+          <p:nvPr/>
+        </p:nvSpPr>
+        <p:spPr>
+          <a:xfrm>
+            <a:off x="502461" y="2593525"/>
+            <a:ext cx="426720" cy="200055"/>
+          </a:xfrm>
+          <a:prstGeom prst="rect">
+            <a:avLst/>
+          </a:prstGeom>
+          <a:noFill/>
+          <a:ln>
+            <a:solidFill>
+              <a:schemeClr val="tx1"/>
+            </a:solidFill>
+          </a:ln>
+        </p:spPr>
+        <p:txBody>
+          <a:bodyPr wrap="none" rtlCol="0">
+            <a:spAutoFit/>
+          </a:bodyPr>
+          <a:lstStyle/>
+          <a:p>
+            <a:r>
+              <a:rPr lang="en-US" sz="700" dirty="0"/>
+              <a:t>List (?)</a:t>
+            </a:r>
+          </a:p>
+        </p:txBody>
+      </p:sp>
+      <p:sp>
+        <p:nvSpPr>
+          <p:cNvPr id="82" name="TextBox 81">
+            <a:extLst>
+              <a:ext uri="{FF2B5EF4-FFF2-40B4-BE49-F238E27FC236}">
+                <a16:creationId xmlns:a16="http://schemas.microsoft.com/office/drawing/2014/main" id="{75071102-6EC1-690E-B278-B89250CFA8D3}"/>
+              </a:ext>
+            </a:extLst>
+          </p:cNvPr>
+          <p:cNvSpPr txBox="1"/>
+          <p:nvPr/>
+        </p:nvSpPr>
+        <p:spPr>
+          <a:xfrm>
+            <a:off x="2017550" y="1940274"/>
+            <a:ext cx="1023037" cy="200055"/>
+          </a:xfrm>
+          <a:prstGeom prst="rect">
+            <a:avLst/>
+          </a:prstGeom>
+          <a:noFill/>
+          <a:ln>
+            <a:solidFill>
+              <a:schemeClr val="tx1"/>
+            </a:solidFill>
+          </a:ln>
+        </p:spPr>
+        <p:txBody>
+          <a:bodyPr wrap="none" rtlCol="0">
+            <a:spAutoFit/>
+          </a:bodyPr>
+          <a:lstStyle/>
+          <a:p>
+            <a:r>
+              <a:rPr lang="en-US" sz="700" dirty="0"/>
+              <a:t>Weed control (ground)</a:t>
+            </a:r>
+          </a:p>
+        </p:txBody>
+      </p:sp>
+      <p:sp>
+        <p:nvSpPr>
+          <p:cNvPr id="83" name="TextBox 82">
+            <a:extLst>
+              <a:ext uri="{FF2B5EF4-FFF2-40B4-BE49-F238E27FC236}">
+                <a16:creationId xmlns:a16="http://schemas.microsoft.com/office/drawing/2014/main" id="{2C4BE5B7-37AB-3877-1E49-027F2F957352}"/>
+              </a:ext>
+            </a:extLst>
+          </p:cNvPr>
+          <p:cNvSpPr txBox="1"/>
+          <p:nvPr/>
+        </p:nvSpPr>
+        <p:spPr>
+          <a:xfrm>
+            <a:off x="2136229" y="2217653"/>
+            <a:ext cx="859531" cy="200055"/>
+          </a:xfrm>
+          <a:prstGeom prst="rect">
+            <a:avLst/>
+          </a:prstGeom>
+          <a:noFill/>
+          <a:ln>
+            <a:solidFill>
+              <a:schemeClr val="tx1"/>
+            </a:solidFill>
+          </a:ln>
+        </p:spPr>
+        <p:txBody>
+          <a:bodyPr wrap="none" rtlCol="0">
+            <a:spAutoFit/>
+          </a:bodyPr>
+          <a:lstStyle/>
+          <a:p>
+            <a:r>
+              <a:rPr lang="en-US" sz="700" dirty="0"/>
+              <a:t>Insect control (air)</a:t>
+            </a:r>
+          </a:p>
+        </p:txBody>
+      </p:sp>
+      <p:sp>
+        <p:nvSpPr>
+          <p:cNvPr id="84" name="TextBox 83">
+            <a:extLst>
+              <a:ext uri="{FF2B5EF4-FFF2-40B4-BE49-F238E27FC236}">
+                <a16:creationId xmlns:a16="http://schemas.microsoft.com/office/drawing/2014/main" id="{224134F4-39A2-C064-CF4C-AD2E8C9F195C}"/>
+              </a:ext>
+            </a:extLst>
+          </p:cNvPr>
+          <p:cNvSpPr txBox="1"/>
+          <p:nvPr/>
+        </p:nvSpPr>
+        <p:spPr>
+          <a:xfrm>
+            <a:off x="2272198" y="2464654"/>
+            <a:ext cx="601447" cy="200055"/>
+          </a:xfrm>
+          <a:prstGeom prst="rect">
+            <a:avLst/>
+          </a:prstGeom>
+          <a:noFill/>
+          <a:ln>
+            <a:solidFill>
+              <a:schemeClr val="tx1"/>
+            </a:solidFill>
+          </a:ln>
+        </p:spPr>
+        <p:txBody>
+          <a:bodyPr wrap="none" rtlCol="0">
+            <a:spAutoFit/>
+          </a:bodyPr>
+          <a:lstStyle/>
+          <a:p>
+            <a:r>
+              <a:rPr lang="en-US" sz="700" dirty="0"/>
+              <a:t>End disk (?)</a:t>
             </a:r>
           </a:p>
         </p:txBody>
       </p:sp>
       <p:grpSp>
         <p:nvGrpSpPr>
-          <p:cNvPr id="89" name="Group 88">
-            <a:extLst>
-              <a:ext uri="{FF2B5EF4-FFF2-40B4-BE49-F238E27FC236}">
-                <a16:creationId xmlns:a16="http://schemas.microsoft.com/office/drawing/2014/main" id="{F8A38D9F-465D-A60F-46AD-5F49258DFD81}"/>
+          <p:cNvPr id="85" name="Group 84">
+            <a:extLst>
+              <a:ext uri="{FF2B5EF4-FFF2-40B4-BE49-F238E27FC236}">
+                <a16:creationId xmlns:a16="http://schemas.microsoft.com/office/drawing/2014/main" id="{690F7CBC-EA8C-8E7D-C763-3501B26770CF}"/>
               </a:ext>
             </a:extLst>
           </p:cNvPr>
@@ -22021,18 +21570,21 @@
         </p:nvGrpSpPr>
         <p:grpSpPr>
           <a:xfrm>
-            <a:off x="5691482" y="3182815"/>
-            <a:ext cx="549638" cy="799744"/>
-            <a:chOff x="4702890" y="3106884"/>
-            <a:chExt cx="549638" cy="799744"/>
-          </a:xfrm>
+            <a:off x="3739485" y="3199754"/>
+            <a:ext cx="386308" cy="387196"/>
+            <a:chOff x="4745158" y="3090106"/>
+            <a:chExt cx="386308" cy="387196"/>
+          </a:xfrm>
+          <a:solidFill>
+            <a:schemeClr val="bg1"/>
+          </a:solidFill>
         </p:grpSpPr>
         <p:sp>
           <p:nvSpPr>
-            <p:cNvPr id="90" name="TextBox 89">
+            <p:cNvPr id="86" name="TextBox 85">
               <a:extLst>
                 <a:ext uri="{FF2B5EF4-FFF2-40B4-BE49-F238E27FC236}">
-                  <a16:creationId xmlns:a16="http://schemas.microsoft.com/office/drawing/2014/main" id="{533D4580-573C-1459-86EB-25B786EFA584}"/>
+                  <a16:creationId xmlns:a16="http://schemas.microsoft.com/office/drawing/2014/main" id="{26112BC7-50C9-5C11-46CE-79CB91AFD518}"/>
                 </a:ext>
               </a:extLst>
             </p:cNvPr>
@@ -22041,15 +21593,119 @@
           </p:nvSpPr>
           <p:spPr>
             <a:xfrm>
-              <a:off x="4702890" y="3106884"/>
+              <a:off x="4745318" y="3090106"/>
+              <a:ext cx="309701" cy="200055"/>
+            </a:xfrm>
+            <a:prstGeom prst="rect">
+              <a:avLst/>
+            </a:prstGeom>
+            <a:grpFill/>
+            <a:ln>
+              <a:solidFill>
+                <a:schemeClr val="tx1"/>
+              </a:solidFill>
+            </a:ln>
+          </p:spPr>
+          <p:txBody>
+            <a:bodyPr wrap="none" rtlCol="0" anchor="ctr">
+              <a:spAutoFit/>
+            </a:bodyPr>
+            <a:lstStyle/>
+            <a:p>
+              <a:pPr algn="ctr"/>
+              <a:r>
+                <a:rPr lang="en-US" sz="700" dirty="0"/>
+                <a:t>Cut</a:t>
+              </a:r>
+            </a:p>
+          </p:txBody>
+        </p:sp>
+        <p:sp>
+          <p:nvSpPr>
+            <p:cNvPr id="87" name="TextBox 86">
+              <a:extLst>
+                <a:ext uri="{FF2B5EF4-FFF2-40B4-BE49-F238E27FC236}">
+                  <a16:creationId xmlns:a16="http://schemas.microsoft.com/office/drawing/2014/main" id="{8A4BEDCA-8DA8-429C-41AF-AC80654AD9B5}"/>
+                </a:ext>
+              </a:extLst>
+            </p:cNvPr>
+            <p:cNvSpPr txBox="1"/>
+            <p:nvPr/>
+          </p:nvSpPr>
+          <p:spPr>
+            <a:xfrm>
+              <a:off x="4745158" y="3277247"/>
+              <a:ext cx="386308" cy="200055"/>
+            </a:xfrm>
+            <a:prstGeom prst="rect">
+              <a:avLst/>
+            </a:prstGeom>
+            <a:grpFill/>
+            <a:ln>
+              <a:solidFill>
+                <a:schemeClr val="tx1"/>
+              </a:solidFill>
+            </a:ln>
+          </p:spPr>
+          <p:txBody>
+            <a:bodyPr wrap="square" rtlCol="0" anchor="ctr">
+              <a:spAutoFit/>
+            </a:bodyPr>
+            <a:lstStyle/>
+            <a:p>
+              <a:pPr algn="ctr"/>
+              <a:r>
+                <a:rPr lang="en-US" sz="700" dirty="0"/>
+                <a:t>Chop</a:t>
+              </a:r>
+            </a:p>
+          </p:txBody>
+        </p:sp>
+      </p:grpSp>
+      <p:grpSp>
+        <p:nvGrpSpPr>
+          <p:cNvPr id="88" name="Group 87">
+            <a:extLst>
+              <a:ext uri="{FF2B5EF4-FFF2-40B4-BE49-F238E27FC236}">
+                <a16:creationId xmlns:a16="http://schemas.microsoft.com/office/drawing/2014/main" id="{8BED9012-F0D9-F3EA-9B07-F436117387F4}"/>
+              </a:ext>
+            </a:extLst>
+          </p:cNvPr>
+          <p:cNvGrpSpPr/>
+          <p:nvPr/>
+        </p:nvGrpSpPr>
+        <p:grpSpPr>
+          <a:xfrm>
+            <a:off x="4232913" y="3166198"/>
+            <a:ext cx="518734" cy="774030"/>
+            <a:chOff x="4745158" y="3090106"/>
+            <a:chExt cx="518734" cy="774030"/>
+          </a:xfrm>
+          <a:solidFill>
+            <a:schemeClr val="bg1"/>
+          </a:solidFill>
+        </p:grpSpPr>
+        <p:sp>
+          <p:nvSpPr>
+            <p:cNvPr id="94" name="TextBox 93">
+              <a:extLst>
+                <a:ext uri="{FF2B5EF4-FFF2-40B4-BE49-F238E27FC236}">
+                  <a16:creationId xmlns:a16="http://schemas.microsoft.com/office/drawing/2014/main" id="{A1B54848-149D-30BA-0A30-E78A01314021}"/>
+                </a:ext>
+              </a:extLst>
+            </p:cNvPr>
+            <p:cNvSpPr txBox="1"/>
+            <p:nvPr/>
+          </p:nvSpPr>
+          <p:spPr>
+            <a:xfrm>
+              <a:off x="4745158" y="3090106"/>
               <a:ext cx="410689" cy="200055"/>
             </a:xfrm>
             <a:prstGeom prst="rect">
               <a:avLst/>
             </a:prstGeom>
-            <a:solidFill>
-              <a:schemeClr val="bg1"/>
-            </a:solidFill>
+            <a:grpFill/>
             <a:ln>
               <a:solidFill>
                 <a:schemeClr val="tx1"/>
@@ -22072,10 +21728,10 @@
         </p:sp>
         <p:sp>
           <p:nvSpPr>
-            <p:cNvPr id="91" name="TextBox 90">
+            <p:cNvPr id="95" name="TextBox 94">
               <a:extLst>
                 <a:ext uri="{FF2B5EF4-FFF2-40B4-BE49-F238E27FC236}">
-                  <a16:creationId xmlns:a16="http://schemas.microsoft.com/office/drawing/2014/main" id="{B15A23FA-1598-0549-5450-82FCBBA8231D}"/>
+                  <a16:creationId xmlns:a16="http://schemas.microsoft.com/office/drawing/2014/main" id="{F1556661-1D06-FA9A-F7F2-985625B99C19}"/>
                 </a:ext>
               </a:extLst>
             </p:cNvPr>
@@ -22084,15 +21740,13 @@
           </p:nvSpPr>
           <p:spPr>
             <a:xfrm>
-              <a:off x="4702890" y="3310264"/>
-              <a:ext cx="378629" cy="200055"/>
+              <a:off x="4745158" y="3284941"/>
+              <a:ext cx="518734" cy="184666"/>
             </a:xfrm>
             <a:prstGeom prst="rect">
               <a:avLst/>
             </a:prstGeom>
-            <a:solidFill>
-              <a:schemeClr val="bg1"/>
-            </a:solidFill>
+            <a:grpFill/>
             <a:ln>
               <a:solidFill>
                 <a:schemeClr val="tx1"/>
@@ -22107,18 +21761,18 @@
             <a:p>
               <a:pPr algn="ctr"/>
               <a:r>
-                <a:rPr lang="en-US" sz="700" dirty="0"/>
-                <a:t>Rake</a:t>
+                <a:rPr lang="en-US" sz="600" dirty="0"/>
+                <a:t>Windrow</a:t>
               </a:r>
             </a:p>
           </p:txBody>
         </p:sp>
         <p:sp>
           <p:nvSpPr>
-            <p:cNvPr id="92" name="TextBox 91">
+            <p:cNvPr id="96" name="TextBox 95">
               <a:extLst>
                 <a:ext uri="{FF2B5EF4-FFF2-40B4-BE49-F238E27FC236}">
-                  <a16:creationId xmlns:a16="http://schemas.microsoft.com/office/drawing/2014/main" id="{375E2812-64E0-2564-48E5-C9CAB9E4839A}"/>
+                  <a16:creationId xmlns:a16="http://schemas.microsoft.com/office/drawing/2014/main" id="{772C028E-89C9-E339-3304-8301BAF7AA44}"/>
                 </a:ext>
               </a:extLst>
             </p:cNvPr>
@@ -22127,15 +21781,13 @@
           </p:nvSpPr>
           <p:spPr>
             <a:xfrm>
-              <a:off x="4702890" y="3511414"/>
+              <a:off x="4745158" y="3468998"/>
               <a:ext cx="341760" cy="200055"/>
             </a:xfrm>
             <a:prstGeom prst="rect">
               <a:avLst/>
             </a:prstGeom>
-            <a:solidFill>
-              <a:schemeClr val="bg1"/>
-            </a:solidFill>
+            <a:grpFill/>
             <a:ln>
               <a:solidFill>
                 <a:schemeClr val="tx1"/>
@@ -22158,10 +21810,10 @@
         </p:sp>
         <p:sp>
           <p:nvSpPr>
-            <p:cNvPr id="93" name="TextBox 92">
+            <p:cNvPr id="97" name="TextBox 96">
               <a:extLst>
                 <a:ext uri="{FF2B5EF4-FFF2-40B4-BE49-F238E27FC236}">
-                  <a16:creationId xmlns:a16="http://schemas.microsoft.com/office/drawing/2014/main" id="{C7FADA5F-3F08-F055-1E6F-5998B3B66D97}"/>
+                  <a16:creationId xmlns:a16="http://schemas.microsoft.com/office/drawing/2014/main" id="{FE7A2F76-192A-263E-6B2F-966372FB830E}"/>
                 </a:ext>
               </a:extLst>
             </p:cNvPr>
@@ -22170,15 +21822,13 @@
           </p:nvSpPr>
           <p:spPr>
             <a:xfrm>
-              <a:off x="4702890" y="3706573"/>
-              <a:ext cx="549638" cy="200055"/>
+              <a:off x="4745158" y="3664081"/>
+              <a:ext cx="378629" cy="200055"/>
             </a:xfrm>
             <a:prstGeom prst="rect">
               <a:avLst/>
             </a:prstGeom>
-            <a:solidFill>
-              <a:schemeClr val="bg1"/>
-            </a:solidFill>
+            <a:grpFill/>
             <a:ln>
               <a:solidFill>
                 <a:schemeClr val="tx1"/>
@@ -22186,14 +21836,15 @@
             </a:ln>
           </p:spPr>
           <p:txBody>
-            <a:bodyPr wrap="square" rtlCol="0" anchor="ctr">
+            <a:bodyPr wrap="none" rtlCol="0" anchor="ctr">
               <a:spAutoFit/>
             </a:bodyPr>
             <a:lstStyle/>
             <a:p>
+              <a:pPr algn="ctr"/>
               <a:r>
                 <a:rPr lang="en-US" sz="700" dirty="0"/>
-                <a:t>Roadside</a:t>
+                <a:t>Stack</a:t>
               </a:r>
             </a:p>
           </p:txBody>
@@ -22201,10 +21852,10 @@
       </p:grpSp>
       <p:grpSp>
         <p:nvGrpSpPr>
-          <p:cNvPr id="99" name="Group 98">
-            <a:extLst>
-              <a:ext uri="{FF2B5EF4-FFF2-40B4-BE49-F238E27FC236}">
-                <a16:creationId xmlns:a16="http://schemas.microsoft.com/office/drawing/2014/main" id="{2F6721CA-9CB4-0E3E-6255-E565B100FF8E}"/>
+          <p:cNvPr id="98" name="Group 97">
+            <a:extLst>
+              <a:ext uri="{FF2B5EF4-FFF2-40B4-BE49-F238E27FC236}">
+                <a16:creationId xmlns:a16="http://schemas.microsoft.com/office/drawing/2014/main" id="{FA01FA73-1B95-E0A3-590F-558B25CB9766}"/>
               </a:ext>
             </a:extLst>
           </p:cNvPr>
@@ -22213,18 +21864,21 @@
         </p:nvGrpSpPr>
         <p:grpSpPr>
           <a:xfrm>
-            <a:off x="6680074" y="3213720"/>
-            <a:ext cx="549638" cy="799744"/>
-            <a:chOff x="4702890" y="3106884"/>
-            <a:chExt cx="549638" cy="799744"/>
-          </a:xfrm>
+            <a:off x="4719798" y="3182976"/>
+            <a:ext cx="518734" cy="774030"/>
+            <a:chOff x="4745158" y="3090106"/>
+            <a:chExt cx="518734" cy="774030"/>
+          </a:xfrm>
+          <a:solidFill>
+            <a:schemeClr val="bg1"/>
+          </a:solidFill>
         </p:grpSpPr>
         <p:sp>
           <p:nvSpPr>
-            <p:cNvPr id="100" name="TextBox 99">
+            <p:cNvPr id="108" name="TextBox 107">
               <a:extLst>
                 <a:ext uri="{FF2B5EF4-FFF2-40B4-BE49-F238E27FC236}">
-                  <a16:creationId xmlns:a16="http://schemas.microsoft.com/office/drawing/2014/main" id="{EE19410F-483C-5730-DA13-1E88DBC7C9C2}"/>
+                  <a16:creationId xmlns:a16="http://schemas.microsoft.com/office/drawing/2014/main" id="{59E032D3-A268-9D35-0155-0210B97CF366}"/>
                 </a:ext>
               </a:extLst>
             </p:cNvPr>
@@ -22233,15 +21887,13 @@
           </p:nvSpPr>
           <p:spPr>
             <a:xfrm>
-              <a:off x="4702890" y="3106884"/>
+              <a:off x="4745158" y="3090106"/>
               <a:ext cx="410689" cy="200055"/>
             </a:xfrm>
             <a:prstGeom prst="rect">
               <a:avLst/>
             </a:prstGeom>
-            <a:solidFill>
-              <a:schemeClr val="bg1"/>
-            </a:solidFill>
+            <a:grpFill/>
             <a:ln>
               <a:solidFill>
                 <a:schemeClr val="tx1"/>
@@ -22264,10 +21916,10 @@
         </p:sp>
         <p:sp>
           <p:nvSpPr>
-            <p:cNvPr id="101" name="TextBox 100">
+            <p:cNvPr id="109" name="TextBox 108">
               <a:extLst>
                 <a:ext uri="{FF2B5EF4-FFF2-40B4-BE49-F238E27FC236}">
-                  <a16:creationId xmlns:a16="http://schemas.microsoft.com/office/drawing/2014/main" id="{25CA9B41-D34F-7ECE-AE95-6994B9D85A73}"/>
+                  <a16:creationId xmlns:a16="http://schemas.microsoft.com/office/drawing/2014/main" id="{AE1795E1-D201-1CF7-D99E-D219050D883F}"/>
                 </a:ext>
               </a:extLst>
             </p:cNvPr>
@@ -22276,15 +21928,13 @@
           </p:nvSpPr>
           <p:spPr>
             <a:xfrm>
-              <a:off x="4702890" y="3310264"/>
-              <a:ext cx="378629" cy="200055"/>
+              <a:off x="4745158" y="3284941"/>
+              <a:ext cx="518734" cy="184666"/>
             </a:xfrm>
             <a:prstGeom prst="rect">
               <a:avLst/>
             </a:prstGeom>
-            <a:solidFill>
-              <a:schemeClr val="bg1"/>
-            </a:solidFill>
+            <a:grpFill/>
             <a:ln>
               <a:solidFill>
                 <a:schemeClr val="tx1"/>
@@ -22299,18 +21949,18 @@
             <a:p>
               <a:pPr algn="ctr"/>
               <a:r>
-                <a:rPr lang="en-US" sz="700" dirty="0"/>
-                <a:t>Rake</a:t>
+                <a:rPr lang="en-US" sz="600" dirty="0"/>
+                <a:t>Windrow</a:t>
               </a:r>
             </a:p>
           </p:txBody>
         </p:sp>
         <p:sp>
           <p:nvSpPr>
-            <p:cNvPr id="102" name="TextBox 101">
+            <p:cNvPr id="110" name="TextBox 109">
               <a:extLst>
                 <a:ext uri="{FF2B5EF4-FFF2-40B4-BE49-F238E27FC236}">
-                  <a16:creationId xmlns:a16="http://schemas.microsoft.com/office/drawing/2014/main" id="{24050E66-341C-07EF-14B3-C65A6F0B2F7F}"/>
+                  <a16:creationId xmlns:a16="http://schemas.microsoft.com/office/drawing/2014/main" id="{06C8C680-4EF2-80CA-59C0-8323A1FDCF42}"/>
                 </a:ext>
               </a:extLst>
             </p:cNvPr>
@@ -22319,15 +21969,13 @@
           </p:nvSpPr>
           <p:spPr>
             <a:xfrm>
-              <a:off x="4702890" y="3511414"/>
+              <a:off x="4745158" y="3468998"/>
               <a:ext cx="341760" cy="200055"/>
             </a:xfrm>
             <a:prstGeom prst="rect">
               <a:avLst/>
             </a:prstGeom>
-            <a:solidFill>
-              <a:schemeClr val="bg1"/>
-            </a:solidFill>
+            <a:grpFill/>
             <a:ln>
               <a:solidFill>
                 <a:schemeClr val="tx1"/>
@@ -22350,10 +21998,10 @@
         </p:sp>
         <p:sp>
           <p:nvSpPr>
-            <p:cNvPr id="103" name="TextBox 102">
+            <p:cNvPr id="111" name="TextBox 110">
               <a:extLst>
                 <a:ext uri="{FF2B5EF4-FFF2-40B4-BE49-F238E27FC236}">
-                  <a16:creationId xmlns:a16="http://schemas.microsoft.com/office/drawing/2014/main" id="{6A0C5A2D-B061-6EE9-D575-7EC3BE4AC60E}"/>
+                  <a16:creationId xmlns:a16="http://schemas.microsoft.com/office/drawing/2014/main" id="{1C1A703B-30EF-E60C-9E40-6C9E3A1D22F1}"/>
                 </a:ext>
               </a:extLst>
             </p:cNvPr>
@@ -22362,15 +22010,119 @@
           </p:nvSpPr>
           <p:spPr>
             <a:xfrm>
-              <a:off x="4702890" y="3706573"/>
-              <a:ext cx="549638" cy="200055"/>
+              <a:off x="4745158" y="3664081"/>
+              <a:ext cx="378629" cy="200055"/>
             </a:xfrm>
             <a:prstGeom prst="rect">
               <a:avLst/>
             </a:prstGeom>
-            <a:solidFill>
-              <a:schemeClr val="bg1"/>
-            </a:solidFill>
+            <a:grpFill/>
+            <a:ln>
+              <a:solidFill>
+                <a:schemeClr val="tx1"/>
+              </a:solidFill>
+            </a:ln>
+          </p:spPr>
+          <p:txBody>
+            <a:bodyPr wrap="none" rtlCol="0" anchor="ctr">
+              <a:spAutoFit/>
+            </a:bodyPr>
+            <a:lstStyle/>
+            <a:p>
+              <a:pPr algn="ctr"/>
+              <a:r>
+                <a:rPr lang="en-US" sz="700" dirty="0"/>
+                <a:t>Stack</a:t>
+              </a:r>
+            </a:p>
+          </p:txBody>
+        </p:sp>
+      </p:grpSp>
+      <p:grpSp>
+        <p:nvGrpSpPr>
+          <p:cNvPr id="112" name="Group 111">
+            <a:extLst>
+              <a:ext uri="{FF2B5EF4-FFF2-40B4-BE49-F238E27FC236}">
+                <a16:creationId xmlns:a16="http://schemas.microsoft.com/office/drawing/2014/main" id="{0698B472-F6ED-F62F-3841-97AF145E852E}"/>
+              </a:ext>
+            </a:extLst>
+          </p:cNvPr>
+          <p:cNvGrpSpPr/>
+          <p:nvPr/>
+        </p:nvGrpSpPr>
+        <p:grpSpPr>
+          <a:xfrm>
+            <a:off x="5188659" y="3199754"/>
+            <a:ext cx="518734" cy="774030"/>
+            <a:chOff x="4745158" y="3090106"/>
+            <a:chExt cx="518734" cy="774030"/>
+          </a:xfrm>
+          <a:solidFill>
+            <a:schemeClr val="bg1"/>
+          </a:solidFill>
+        </p:grpSpPr>
+        <p:sp>
+          <p:nvSpPr>
+            <p:cNvPr id="138" name="TextBox 137">
+              <a:extLst>
+                <a:ext uri="{FF2B5EF4-FFF2-40B4-BE49-F238E27FC236}">
+                  <a16:creationId xmlns:a16="http://schemas.microsoft.com/office/drawing/2014/main" id="{831D0706-1A35-88F6-A7E7-0147A3CEF837}"/>
+                </a:ext>
+              </a:extLst>
+            </p:cNvPr>
+            <p:cNvSpPr txBox="1"/>
+            <p:nvPr/>
+          </p:nvSpPr>
+          <p:spPr>
+            <a:xfrm>
+              <a:off x="4745158" y="3090106"/>
+              <a:ext cx="410689" cy="200055"/>
+            </a:xfrm>
+            <a:prstGeom prst="rect">
+              <a:avLst/>
+            </a:prstGeom>
+            <a:grpFill/>
+            <a:ln>
+              <a:solidFill>
+                <a:schemeClr val="tx1"/>
+              </a:solidFill>
+            </a:ln>
+          </p:spPr>
+          <p:txBody>
+            <a:bodyPr wrap="none" rtlCol="0" anchor="ctr">
+              <a:spAutoFit/>
+            </a:bodyPr>
+            <a:lstStyle/>
+            <a:p>
+              <a:pPr algn="ctr"/>
+              <a:r>
+                <a:rPr lang="en-US" sz="700" dirty="0"/>
+                <a:t>Swath</a:t>
+              </a:r>
+            </a:p>
+          </p:txBody>
+        </p:sp>
+        <p:sp>
+          <p:nvSpPr>
+            <p:cNvPr id="139" name="TextBox 138">
+              <a:extLst>
+                <a:ext uri="{FF2B5EF4-FFF2-40B4-BE49-F238E27FC236}">
+                  <a16:creationId xmlns:a16="http://schemas.microsoft.com/office/drawing/2014/main" id="{A8FDFD9D-92B7-56D7-4DAB-FEF8E1CDCB39}"/>
+                </a:ext>
+              </a:extLst>
+            </p:cNvPr>
+            <p:cNvSpPr txBox="1"/>
+            <p:nvPr/>
+          </p:nvSpPr>
+          <p:spPr>
+            <a:xfrm>
+              <a:off x="4745158" y="3284941"/>
+              <a:ext cx="518734" cy="184666"/>
+            </a:xfrm>
+            <a:prstGeom prst="rect">
+              <a:avLst/>
+            </a:prstGeom>
+            <a:grpFill/>
             <a:ln>
               <a:solidFill>
                 <a:schemeClr val="tx1"/>
@@ -22383,573 +22135,20 @@
             </a:bodyPr>
             <a:lstStyle/>
             <a:p>
+              <a:pPr algn="ctr"/>
               <a:r>
-                <a:rPr lang="en-US" sz="700" dirty="0"/>
-                <a:t>Roadside</a:t>
+                <a:rPr lang="en-US" sz="600" dirty="0"/>
+                <a:t>Windrow</a:t>
               </a:r>
             </a:p>
           </p:txBody>
         </p:sp>
-      </p:grpSp>
-      <p:sp>
-        <p:nvSpPr>
-          <p:cNvPr id="177" name="TextBox 176">
-            <a:extLst>
-              <a:ext uri="{FF2B5EF4-FFF2-40B4-BE49-F238E27FC236}">
-                <a16:creationId xmlns:a16="http://schemas.microsoft.com/office/drawing/2014/main" id="{0B410749-2F46-B513-3F33-E8F3E5F3B993}"/>
-              </a:ext>
-            </a:extLst>
-          </p:cNvPr>
-          <p:cNvSpPr txBox="1"/>
-          <p:nvPr/>
-        </p:nvSpPr>
-        <p:spPr>
-          <a:xfrm>
-            <a:off x="1896080" y="1940274"/>
-            <a:ext cx="867545" cy="200055"/>
-          </a:xfrm>
-          <a:prstGeom prst="rect">
-            <a:avLst/>
-          </a:prstGeom>
-          <a:noFill/>
-          <a:ln>
-            <a:solidFill>
-              <a:schemeClr val="tx1"/>
-            </a:solidFill>
-          </a:ln>
-        </p:spPr>
-        <p:txBody>
-          <a:bodyPr wrap="none" rtlCol="0">
-            <a:spAutoFit/>
-          </a:bodyPr>
-          <a:lstStyle/>
-          <a:p>
-            <a:r>
-              <a:rPr lang="en-US" sz="700" dirty="0"/>
-              <a:t>Sprinkler irrigation</a:t>
-            </a:r>
-          </a:p>
-        </p:txBody>
-      </p:sp>
-      <p:sp>
-        <p:nvSpPr>
-          <p:cNvPr id="178" name="TextBox 177">
-            <a:extLst>
-              <a:ext uri="{FF2B5EF4-FFF2-40B4-BE49-F238E27FC236}">
-                <a16:creationId xmlns:a16="http://schemas.microsoft.com/office/drawing/2014/main" id="{EA8C4F7F-57D2-A271-2015-8678DC49CA03}"/>
-              </a:ext>
-            </a:extLst>
-          </p:cNvPr>
-          <p:cNvSpPr txBox="1"/>
-          <p:nvPr/>
-        </p:nvSpPr>
-        <p:spPr>
-          <a:xfrm>
-            <a:off x="1965041" y="2196456"/>
-            <a:ext cx="867545" cy="200055"/>
-          </a:xfrm>
-          <a:prstGeom prst="rect">
-            <a:avLst/>
-          </a:prstGeom>
-          <a:noFill/>
-          <a:ln>
-            <a:solidFill>
-              <a:schemeClr val="tx1"/>
-            </a:solidFill>
-          </a:ln>
-        </p:spPr>
-        <p:txBody>
-          <a:bodyPr wrap="none" rtlCol="0">
-            <a:spAutoFit/>
-          </a:bodyPr>
-          <a:lstStyle/>
-          <a:p>
-            <a:r>
-              <a:rPr lang="en-US" sz="700" dirty="0"/>
-              <a:t>Sprinkler irrigation</a:t>
-            </a:r>
-          </a:p>
-        </p:txBody>
-      </p:sp>
-      <p:sp>
-        <p:nvSpPr>
-          <p:cNvPr id="179" name="TextBox 178">
-            <a:extLst>
-              <a:ext uri="{FF2B5EF4-FFF2-40B4-BE49-F238E27FC236}">
-                <a16:creationId xmlns:a16="http://schemas.microsoft.com/office/drawing/2014/main" id="{B85A327A-C04B-04B7-FFBE-4C5C86106272}"/>
-              </a:ext>
-            </a:extLst>
-          </p:cNvPr>
-          <p:cNvSpPr txBox="1"/>
-          <p:nvPr/>
-        </p:nvSpPr>
-        <p:spPr>
-          <a:xfrm>
-            <a:off x="4207385" y="2473590"/>
-            <a:ext cx="1484702" cy="200055"/>
-          </a:xfrm>
-          <a:prstGeom prst="rect">
-            <a:avLst/>
-          </a:prstGeom>
-          <a:noFill/>
-          <a:ln>
-            <a:solidFill>
-              <a:schemeClr val="tx1"/>
-            </a:solidFill>
-          </a:ln>
-        </p:spPr>
-        <p:txBody>
-          <a:bodyPr wrap="none" rtlCol="0">
-            <a:spAutoFit/>
-          </a:bodyPr>
-          <a:lstStyle/>
-          <a:p>
-            <a:r>
-              <a:rPr lang="en-US" sz="700" dirty="0"/>
-              <a:t>Spread fertilizer (MAP + S + potash)</a:t>
-            </a:r>
-          </a:p>
-        </p:txBody>
-      </p:sp>
-      <p:sp>
-        <p:nvSpPr>
-          <p:cNvPr id="70" name="TextBox 69">
-            <a:extLst>
-              <a:ext uri="{FF2B5EF4-FFF2-40B4-BE49-F238E27FC236}">
-                <a16:creationId xmlns:a16="http://schemas.microsoft.com/office/drawing/2014/main" id="{6DCF2481-43B7-634F-DBA8-30308965AD79}"/>
-              </a:ext>
-            </a:extLst>
-          </p:cNvPr>
-          <p:cNvSpPr txBox="1"/>
-          <p:nvPr/>
-        </p:nvSpPr>
-        <p:spPr>
-          <a:xfrm>
-            <a:off x="1446747" y="910846"/>
-            <a:ext cx="2266967" cy="369332"/>
-          </a:xfrm>
-          <a:prstGeom prst="rect">
-            <a:avLst/>
-          </a:prstGeom>
-          <a:noFill/>
-          <a:ln>
-            <a:solidFill>
-              <a:schemeClr val="bg1"/>
-            </a:solidFill>
-          </a:ln>
-        </p:spPr>
-        <p:txBody>
-          <a:bodyPr wrap="none" rtlCol="0">
-            <a:spAutoFit/>
-          </a:bodyPr>
-          <a:lstStyle/>
-          <a:p>
-            <a:r>
-              <a:rPr lang="en-US" sz="900" i="1" dirty="0">
-                <a:solidFill>
-                  <a:srgbClr val="FF0000"/>
-                </a:solidFill>
-              </a:rPr>
-              <a:t>Four irrigations totaling 4.5 ac-in</a:t>
-            </a:r>
-          </a:p>
-          <a:p>
-            <a:r>
-              <a:rPr lang="en-US" sz="900" i="1" dirty="0">
-                <a:solidFill>
-                  <a:srgbClr val="FF0000"/>
-                </a:solidFill>
-              </a:rPr>
-              <a:t>12 wheel-line sprinklers and one center pivot</a:t>
-            </a:r>
-          </a:p>
-        </p:txBody>
-      </p:sp>
-      <p:sp>
-        <p:nvSpPr>
-          <p:cNvPr id="71" name="TextBox 70">
-            <a:extLst>
-              <a:ext uri="{FF2B5EF4-FFF2-40B4-BE49-F238E27FC236}">
-                <a16:creationId xmlns:a16="http://schemas.microsoft.com/office/drawing/2014/main" id="{DD681186-8708-811C-E762-A23334824168}"/>
-              </a:ext>
-            </a:extLst>
-          </p:cNvPr>
-          <p:cNvSpPr txBox="1"/>
-          <p:nvPr/>
-        </p:nvSpPr>
-        <p:spPr>
-          <a:xfrm>
-            <a:off x="2044888" y="2458962"/>
-            <a:ext cx="867545" cy="200055"/>
-          </a:xfrm>
-          <a:prstGeom prst="rect">
-            <a:avLst/>
-          </a:prstGeom>
-          <a:noFill/>
-          <a:ln>
-            <a:solidFill>
-              <a:schemeClr val="tx1"/>
-            </a:solidFill>
-          </a:ln>
-        </p:spPr>
-        <p:txBody>
-          <a:bodyPr wrap="none" rtlCol="0">
-            <a:spAutoFit/>
-          </a:bodyPr>
-          <a:lstStyle/>
-          <a:p>
-            <a:r>
-              <a:rPr lang="en-US" sz="700" dirty="0"/>
-              <a:t>Sprinkler irrigation</a:t>
-            </a:r>
-          </a:p>
-        </p:txBody>
-      </p:sp>
-      <p:sp>
-        <p:nvSpPr>
-          <p:cNvPr id="77" name="TextBox 76">
-            <a:extLst>
-              <a:ext uri="{FF2B5EF4-FFF2-40B4-BE49-F238E27FC236}">
-                <a16:creationId xmlns:a16="http://schemas.microsoft.com/office/drawing/2014/main" id="{D816EC90-633F-BD2F-2937-A9A177D3DF78}"/>
-              </a:ext>
-            </a:extLst>
-          </p:cNvPr>
-          <p:cNvSpPr txBox="1"/>
-          <p:nvPr/>
-        </p:nvSpPr>
-        <p:spPr>
-          <a:xfrm>
-            <a:off x="3401233" y="2089050"/>
-            <a:ext cx="1467068" cy="200055"/>
-          </a:xfrm>
-          <a:prstGeom prst="rect">
-            <a:avLst/>
-          </a:prstGeom>
-          <a:solidFill>
-            <a:schemeClr val="bg2"/>
-          </a:solidFill>
-          <a:ln>
-            <a:solidFill>
-              <a:schemeClr val="tx1"/>
-            </a:solidFill>
-          </a:ln>
-        </p:spPr>
-        <p:txBody>
-          <a:bodyPr wrap="none" rtlCol="0">
-            <a:spAutoFit/>
-          </a:bodyPr>
-          <a:lstStyle/>
-          <a:p>
-            <a:r>
-              <a:rPr lang="en-US" sz="700" dirty="0" err="1"/>
-              <a:t>TriCor</a:t>
-            </a:r>
-            <a:r>
-              <a:rPr lang="en-US" sz="700" dirty="0"/>
-              <a:t> 75DF, </a:t>
-            </a:r>
-            <a:r>
-              <a:rPr lang="en-US" sz="700" dirty="0" err="1"/>
-              <a:t>Gramoxone</a:t>
-            </a:r>
-            <a:r>
-              <a:rPr lang="en-US" sz="700" dirty="0"/>
-              <a:t>, Activator</a:t>
-            </a:r>
-          </a:p>
-        </p:txBody>
-      </p:sp>
-      <p:sp>
-        <p:nvSpPr>
-          <p:cNvPr id="80" name="TextBox 79">
-            <a:extLst>
-              <a:ext uri="{FF2B5EF4-FFF2-40B4-BE49-F238E27FC236}">
-                <a16:creationId xmlns:a16="http://schemas.microsoft.com/office/drawing/2014/main" id="{A04EC621-CB9E-AF32-4E3E-49E543C1F3D2}"/>
-              </a:ext>
-            </a:extLst>
-          </p:cNvPr>
-          <p:cNvSpPr txBox="1"/>
-          <p:nvPr/>
-        </p:nvSpPr>
-        <p:spPr>
-          <a:xfrm>
-            <a:off x="6154122" y="2466457"/>
-            <a:ext cx="487634" cy="200055"/>
-          </a:xfrm>
-          <a:prstGeom prst="rect">
-            <a:avLst/>
-          </a:prstGeom>
-          <a:solidFill>
-            <a:schemeClr val="bg2"/>
-          </a:solidFill>
-          <a:ln>
-            <a:solidFill>
-              <a:schemeClr val="tx1"/>
-            </a:solidFill>
-          </a:ln>
-        </p:spPr>
-        <p:txBody>
-          <a:bodyPr wrap="none" rtlCol="0">
-            <a:spAutoFit/>
-          </a:bodyPr>
-          <a:lstStyle/>
-          <a:p>
-            <a:r>
-              <a:rPr lang="en-US" sz="700" dirty="0"/>
-              <a:t>Steward</a:t>
-            </a:r>
-          </a:p>
-        </p:txBody>
-      </p:sp>
-      <p:sp>
-        <p:nvSpPr>
-          <p:cNvPr id="81" name="TextBox 80">
-            <a:extLst>
-              <a:ext uri="{FF2B5EF4-FFF2-40B4-BE49-F238E27FC236}">
-                <a16:creationId xmlns:a16="http://schemas.microsoft.com/office/drawing/2014/main" id="{2AC555FC-B04A-9471-39B7-BCCE77DFE508}"/>
-              </a:ext>
-            </a:extLst>
-          </p:cNvPr>
-          <p:cNvSpPr txBox="1"/>
-          <p:nvPr/>
-        </p:nvSpPr>
-        <p:spPr>
-          <a:xfrm>
-            <a:off x="4201555" y="1729684"/>
-            <a:ext cx="734496" cy="200055"/>
-          </a:xfrm>
-          <a:prstGeom prst="rect">
-            <a:avLst/>
-          </a:prstGeom>
-          <a:solidFill>
-            <a:schemeClr val="bg2"/>
-          </a:solidFill>
-          <a:ln>
-            <a:solidFill>
-              <a:schemeClr val="tx1"/>
-            </a:solidFill>
-          </a:ln>
-        </p:spPr>
-        <p:txBody>
-          <a:bodyPr wrap="none" rtlCol="0">
-            <a:spAutoFit/>
-          </a:bodyPr>
-          <a:lstStyle/>
-          <a:p>
-            <a:r>
-              <a:rPr lang="en-US" sz="700" dirty="0"/>
-              <a:t>Zinc phosphide</a:t>
-            </a:r>
-          </a:p>
-        </p:txBody>
-      </p:sp>
-      <p:sp>
-        <p:nvSpPr>
-          <p:cNvPr id="104" name="TextBox 103">
-            <a:extLst>
-              <a:ext uri="{FF2B5EF4-FFF2-40B4-BE49-F238E27FC236}">
-                <a16:creationId xmlns:a16="http://schemas.microsoft.com/office/drawing/2014/main" id="{8B83C67D-2677-00A7-5C31-6766DB788EB5}"/>
-              </a:ext>
-            </a:extLst>
-          </p:cNvPr>
-          <p:cNvSpPr txBox="1"/>
-          <p:nvPr/>
-        </p:nvSpPr>
-        <p:spPr>
-          <a:xfrm>
-            <a:off x="4443393" y="4296760"/>
-            <a:ext cx="1484702" cy="200055"/>
-          </a:xfrm>
-          <a:prstGeom prst="rect">
-            <a:avLst/>
-          </a:prstGeom>
-          <a:noFill/>
-          <a:ln>
-            <a:solidFill>
-              <a:schemeClr val="tx1"/>
-            </a:solidFill>
-          </a:ln>
-        </p:spPr>
-        <p:txBody>
-          <a:bodyPr wrap="none" rtlCol="0">
-            <a:spAutoFit/>
-          </a:bodyPr>
-          <a:lstStyle/>
-          <a:p>
-            <a:r>
-              <a:rPr lang="en-US" sz="700" dirty="0"/>
-              <a:t>Spread fertilizer (MAP + S + potash)</a:t>
-            </a:r>
-          </a:p>
-        </p:txBody>
-      </p:sp>
-      <p:sp>
-        <p:nvSpPr>
-          <p:cNvPr id="105" name="TextBox 104">
-            <a:extLst>
-              <a:ext uri="{FF2B5EF4-FFF2-40B4-BE49-F238E27FC236}">
-                <a16:creationId xmlns:a16="http://schemas.microsoft.com/office/drawing/2014/main" id="{5764A52C-912D-51DF-2A7B-E1BCC5FFAB8E}"/>
-              </a:ext>
-            </a:extLst>
-          </p:cNvPr>
-          <p:cNvSpPr txBox="1"/>
-          <p:nvPr/>
-        </p:nvSpPr>
-        <p:spPr>
-          <a:xfrm>
-            <a:off x="3545725" y="4029610"/>
-            <a:ext cx="1467068" cy="200055"/>
-          </a:xfrm>
-          <a:prstGeom prst="rect">
-            <a:avLst/>
-          </a:prstGeom>
-          <a:solidFill>
-            <a:schemeClr val="bg2"/>
-          </a:solidFill>
-          <a:ln>
-            <a:solidFill>
-              <a:schemeClr val="tx1"/>
-            </a:solidFill>
-          </a:ln>
-        </p:spPr>
-        <p:txBody>
-          <a:bodyPr wrap="none" rtlCol="0">
-            <a:spAutoFit/>
-          </a:bodyPr>
-          <a:lstStyle/>
-          <a:p>
-            <a:r>
-              <a:rPr lang="en-US" sz="700" dirty="0" err="1"/>
-              <a:t>TriCor</a:t>
-            </a:r>
-            <a:r>
-              <a:rPr lang="en-US" sz="700" dirty="0"/>
-              <a:t> 75DF, </a:t>
-            </a:r>
-            <a:r>
-              <a:rPr lang="en-US" sz="700" dirty="0" err="1"/>
-              <a:t>Gramoxone</a:t>
-            </a:r>
-            <a:r>
-              <a:rPr lang="en-US" sz="700" dirty="0"/>
-              <a:t>, Activator</a:t>
-            </a:r>
-          </a:p>
-        </p:txBody>
-      </p:sp>
-      <p:sp>
-        <p:nvSpPr>
-          <p:cNvPr id="106" name="TextBox 105">
-            <a:extLst>
-              <a:ext uri="{FF2B5EF4-FFF2-40B4-BE49-F238E27FC236}">
-                <a16:creationId xmlns:a16="http://schemas.microsoft.com/office/drawing/2014/main" id="{0B7A230E-8918-8E7F-A716-C20B123B8CB5}"/>
-              </a:ext>
-            </a:extLst>
-          </p:cNvPr>
-          <p:cNvSpPr txBox="1"/>
-          <p:nvPr/>
-        </p:nvSpPr>
-        <p:spPr>
-          <a:xfrm>
-            <a:off x="6363320" y="4285367"/>
-            <a:ext cx="487634" cy="200055"/>
-          </a:xfrm>
-          <a:prstGeom prst="rect">
-            <a:avLst/>
-          </a:prstGeom>
-          <a:solidFill>
-            <a:schemeClr val="bg2"/>
-          </a:solidFill>
-          <a:ln>
-            <a:solidFill>
-              <a:schemeClr val="tx1"/>
-            </a:solidFill>
-          </a:ln>
-        </p:spPr>
-        <p:txBody>
-          <a:bodyPr wrap="none" rtlCol="0">
-            <a:spAutoFit/>
-          </a:bodyPr>
-          <a:lstStyle/>
-          <a:p>
-            <a:r>
-              <a:rPr lang="en-US" sz="700" dirty="0"/>
-              <a:t>Steward</a:t>
-            </a:r>
-          </a:p>
-        </p:txBody>
-      </p:sp>
-      <p:sp>
-        <p:nvSpPr>
-          <p:cNvPr id="107" name="TextBox 106">
-            <a:extLst>
-              <a:ext uri="{FF2B5EF4-FFF2-40B4-BE49-F238E27FC236}">
-                <a16:creationId xmlns:a16="http://schemas.microsoft.com/office/drawing/2014/main" id="{72F37748-025E-00BF-C4B9-9AFF81EB7E90}"/>
-              </a:ext>
-            </a:extLst>
-          </p:cNvPr>
-          <p:cNvSpPr txBox="1"/>
-          <p:nvPr/>
-        </p:nvSpPr>
-        <p:spPr>
-          <a:xfrm>
-            <a:off x="3511966" y="4298786"/>
-            <a:ext cx="734496" cy="200055"/>
-          </a:xfrm>
-          <a:prstGeom prst="rect">
-            <a:avLst/>
-          </a:prstGeom>
-          <a:solidFill>
-            <a:schemeClr val="bg2"/>
-          </a:solidFill>
-          <a:ln>
-            <a:solidFill>
-              <a:schemeClr val="tx1"/>
-            </a:solidFill>
-          </a:ln>
-        </p:spPr>
-        <p:txBody>
-          <a:bodyPr wrap="none" rtlCol="0">
-            <a:spAutoFit/>
-          </a:bodyPr>
-          <a:lstStyle/>
-          <a:p>
-            <a:r>
-              <a:rPr lang="en-US" sz="700" dirty="0"/>
-              <a:t>Zinc phosphide</a:t>
-            </a:r>
-          </a:p>
-        </p:txBody>
-      </p:sp>
-      <p:grpSp>
-        <p:nvGrpSpPr>
-          <p:cNvPr id="113" name="Group 112">
-            <a:extLst>
-              <a:ext uri="{FF2B5EF4-FFF2-40B4-BE49-F238E27FC236}">
-                <a16:creationId xmlns:a16="http://schemas.microsoft.com/office/drawing/2014/main" id="{D17DB21F-73BC-2420-923E-A5FCFF08AFB7}"/>
-              </a:ext>
-            </a:extLst>
-          </p:cNvPr>
-          <p:cNvGrpSpPr/>
-          <p:nvPr/>
-        </p:nvGrpSpPr>
-        <p:grpSpPr>
-          <a:xfrm>
-            <a:off x="4418782" y="5734756"/>
-            <a:ext cx="5826013" cy="276999"/>
-            <a:chOff x="4922010" y="6329802"/>
-            <a:chExt cx="5826013" cy="276999"/>
-          </a:xfrm>
-          <a:solidFill>
-            <a:schemeClr val="accent3"/>
-          </a:solidFill>
-        </p:grpSpPr>
         <p:sp>
           <p:nvSpPr>
-            <p:cNvPr id="114" name="TextBox 113">
+            <p:cNvPr id="143" name="TextBox 142">
               <a:extLst>
                 <a:ext uri="{FF2B5EF4-FFF2-40B4-BE49-F238E27FC236}">
-                  <a16:creationId xmlns:a16="http://schemas.microsoft.com/office/drawing/2014/main" id="{E9350737-5493-362A-2D64-09A10D10238F}"/>
+                  <a16:creationId xmlns:a16="http://schemas.microsoft.com/office/drawing/2014/main" id="{49457F3A-6532-E594-E2E7-F3AA5D1B2010}"/>
                 </a:ext>
               </a:extLst>
             </p:cNvPr>
@@ -22958,8 +22157,8 @@
           </p:nvSpPr>
           <p:spPr>
             <a:xfrm>
-              <a:off x="4922010" y="6329802"/>
-              <a:ext cx="457937" cy="276999"/>
+              <a:off x="4745158" y="3468998"/>
+              <a:ext cx="341760" cy="200055"/>
             </a:xfrm>
             <a:prstGeom prst="rect">
               <a:avLst/>
@@ -22972,25 +22171,25 @@
             </a:ln>
           </p:spPr>
           <p:txBody>
-            <a:bodyPr wrap="square" rtlCol="0">
+            <a:bodyPr wrap="none" rtlCol="0" anchor="ctr">
               <a:spAutoFit/>
             </a:bodyPr>
             <a:lstStyle/>
             <a:p>
               <a:pPr algn="ctr"/>
               <a:r>
-                <a:rPr lang="en-US" sz="1200" dirty="0"/>
-                <a:t>Jan</a:t>
+                <a:rPr lang="en-US" sz="700" dirty="0"/>
+                <a:t>Bale</a:t>
               </a:r>
             </a:p>
           </p:txBody>
         </p:sp>
         <p:sp>
           <p:nvSpPr>
-            <p:cNvPr id="115" name="TextBox 114">
+            <p:cNvPr id="147" name="TextBox 146">
               <a:extLst>
                 <a:ext uri="{FF2B5EF4-FFF2-40B4-BE49-F238E27FC236}">
-                  <a16:creationId xmlns:a16="http://schemas.microsoft.com/office/drawing/2014/main" id="{310824C4-6051-A8D9-193A-1A4A773F1658}"/>
+                  <a16:creationId xmlns:a16="http://schemas.microsoft.com/office/drawing/2014/main" id="{56A919AB-A179-D7DD-1920-0E315A432153}"/>
                 </a:ext>
               </a:extLst>
             </p:cNvPr>
@@ -22999,8 +22198,8 @@
           </p:nvSpPr>
           <p:spPr>
             <a:xfrm>
-              <a:off x="5410017" y="6329802"/>
-              <a:ext cx="457937" cy="276999"/>
+              <a:off x="4745158" y="3664081"/>
+              <a:ext cx="378629" cy="200055"/>
             </a:xfrm>
             <a:prstGeom prst="rect">
               <a:avLst/>
@@ -23013,25 +22212,49 @@
             </a:ln>
           </p:spPr>
           <p:txBody>
-            <a:bodyPr wrap="square" rtlCol="0">
+            <a:bodyPr wrap="none" rtlCol="0" anchor="ctr">
               <a:spAutoFit/>
             </a:bodyPr>
             <a:lstStyle/>
             <a:p>
               <a:pPr algn="ctr"/>
               <a:r>
-                <a:rPr lang="en-US" sz="1200" dirty="0"/>
-                <a:t>Feb</a:t>
+                <a:rPr lang="en-US" sz="700" dirty="0"/>
+                <a:t>Stack</a:t>
               </a:r>
             </a:p>
           </p:txBody>
         </p:sp>
+      </p:grpSp>
+      <p:grpSp>
+        <p:nvGrpSpPr>
+          <p:cNvPr id="148" name="Group 147">
+            <a:extLst>
+              <a:ext uri="{FF2B5EF4-FFF2-40B4-BE49-F238E27FC236}">
+                <a16:creationId xmlns:a16="http://schemas.microsoft.com/office/drawing/2014/main" id="{CF58CC74-762B-25C0-8A3C-BEFDFEA524CE}"/>
+              </a:ext>
+            </a:extLst>
+          </p:cNvPr>
+          <p:cNvGrpSpPr/>
+          <p:nvPr/>
+        </p:nvGrpSpPr>
+        <p:grpSpPr>
+          <a:xfrm>
+            <a:off x="5696152" y="3216532"/>
+            <a:ext cx="518734" cy="774030"/>
+            <a:chOff x="4745158" y="3090106"/>
+            <a:chExt cx="518734" cy="774030"/>
+          </a:xfrm>
+          <a:solidFill>
+            <a:schemeClr val="bg1"/>
+          </a:solidFill>
+        </p:grpSpPr>
         <p:sp>
           <p:nvSpPr>
-            <p:cNvPr id="116" name="TextBox 115">
+            <p:cNvPr id="149" name="TextBox 148">
               <a:extLst>
                 <a:ext uri="{FF2B5EF4-FFF2-40B4-BE49-F238E27FC236}">
-                  <a16:creationId xmlns:a16="http://schemas.microsoft.com/office/drawing/2014/main" id="{629D1A95-B75F-D5E2-930C-5BE66B4EB2E2}"/>
+                  <a16:creationId xmlns:a16="http://schemas.microsoft.com/office/drawing/2014/main" id="{2928F7DA-F582-13C0-87BE-BE35B75BD438}"/>
                 </a:ext>
               </a:extLst>
             </p:cNvPr>
@@ -23040,8 +22263,8 @@
           </p:nvSpPr>
           <p:spPr>
             <a:xfrm>
-              <a:off x="5898024" y="6329802"/>
-              <a:ext cx="457937" cy="276999"/>
+              <a:off x="4745158" y="3090106"/>
+              <a:ext cx="410689" cy="200055"/>
             </a:xfrm>
             <a:prstGeom prst="rect">
               <a:avLst/>
@@ -23054,25 +22277,25 @@
             </a:ln>
           </p:spPr>
           <p:txBody>
-            <a:bodyPr wrap="square" rtlCol="0">
+            <a:bodyPr wrap="none" rtlCol="0" anchor="ctr">
               <a:spAutoFit/>
             </a:bodyPr>
             <a:lstStyle/>
             <a:p>
               <a:pPr algn="ctr"/>
               <a:r>
-                <a:rPr lang="en-US" sz="1200" dirty="0"/>
-                <a:t>Mar</a:t>
+                <a:rPr lang="en-US" sz="700" dirty="0"/>
+                <a:t>Swath</a:t>
               </a:r>
             </a:p>
           </p:txBody>
         </p:sp>
         <p:sp>
           <p:nvSpPr>
-            <p:cNvPr id="117" name="TextBox 116">
+            <p:cNvPr id="150" name="TextBox 149">
               <a:extLst>
                 <a:ext uri="{FF2B5EF4-FFF2-40B4-BE49-F238E27FC236}">
-                  <a16:creationId xmlns:a16="http://schemas.microsoft.com/office/drawing/2014/main" id="{3C6D5B69-E693-030B-69AE-CA57DFBC5304}"/>
+                  <a16:creationId xmlns:a16="http://schemas.microsoft.com/office/drawing/2014/main" id="{6FCDCA59-C26E-B5A5-1FEA-8EA1E52E25F8}"/>
                 </a:ext>
               </a:extLst>
             </p:cNvPr>
@@ -23081,8 +22304,8 @@
           </p:nvSpPr>
           <p:spPr>
             <a:xfrm>
-              <a:off x="6386031" y="6329802"/>
-              <a:ext cx="457937" cy="276999"/>
+              <a:off x="4745158" y="3284941"/>
+              <a:ext cx="518734" cy="184666"/>
             </a:xfrm>
             <a:prstGeom prst="rect">
               <a:avLst/>
@@ -23095,25 +22318,25 @@
             </a:ln>
           </p:spPr>
           <p:txBody>
-            <a:bodyPr wrap="square" rtlCol="0">
+            <a:bodyPr wrap="square" rtlCol="0" anchor="ctr">
               <a:spAutoFit/>
             </a:bodyPr>
             <a:lstStyle/>
             <a:p>
               <a:pPr algn="ctr"/>
               <a:r>
-                <a:rPr lang="en-US" sz="1200" dirty="0"/>
-                <a:t>Apr</a:t>
+                <a:rPr lang="en-US" sz="600" dirty="0"/>
+                <a:t>Windrow</a:t>
               </a:r>
             </a:p>
           </p:txBody>
         </p:sp>
         <p:sp>
           <p:nvSpPr>
-            <p:cNvPr id="118" name="TextBox 117">
+            <p:cNvPr id="151" name="TextBox 150">
               <a:extLst>
                 <a:ext uri="{FF2B5EF4-FFF2-40B4-BE49-F238E27FC236}">
-                  <a16:creationId xmlns:a16="http://schemas.microsoft.com/office/drawing/2014/main" id="{57BD0C9A-0E1E-0C6E-99EE-1AD16AEC14CB}"/>
+                  <a16:creationId xmlns:a16="http://schemas.microsoft.com/office/drawing/2014/main" id="{1C78900E-F7E0-30ED-F9BA-93589ACBBEB8}"/>
                 </a:ext>
               </a:extLst>
             </p:cNvPr>
@@ -23122,8 +22345,8 @@
           </p:nvSpPr>
           <p:spPr>
             <a:xfrm>
-              <a:off x="6874038" y="6329802"/>
-              <a:ext cx="457937" cy="276999"/>
+              <a:off x="4745158" y="3468998"/>
+              <a:ext cx="341760" cy="200055"/>
             </a:xfrm>
             <a:prstGeom prst="rect">
               <a:avLst/>
@@ -23136,25 +22359,25 @@
             </a:ln>
           </p:spPr>
           <p:txBody>
-            <a:bodyPr wrap="square" rtlCol="0">
+            <a:bodyPr wrap="none" rtlCol="0" anchor="ctr">
               <a:spAutoFit/>
             </a:bodyPr>
             <a:lstStyle/>
             <a:p>
               <a:pPr algn="ctr"/>
               <a:r>
-                <a:rPr lang="en-US" sz="1200" dirty="0"/>
-                <a:t>May</a:t>
+                <a:rPr lang="en-US" sz="700" dirty="0"/>
+                <a:t>Bale</a:t>
               </a:r>
             </a:p>
           </p:txBody>
         </p:sp>
         <p:sp>
           <p:nvSpPr>
-            <p:cNvPr id="119" name="TextBox 118">
+            <p:cNvPr id="152" name="TextBox 151">
               <a:extLst>
                 <a:ext uri="{FF2B5EF4-FFF2-40B4-BE49-F238E27FC236}">
-                  <a16:creationId xmlns:a16="http://schemas.microsoft.com/office/drawing/2014/main" id="{5526C090-F968-2DAB-DDBE-912078460588}"/>
+                  <a16:creationId xmlns:a16="http://schemas.microsoft.com/office/drawing/2014/main" id="{F82EE09D-4BBC-7C59-DA27-703E2AC29CEE}"/>
                 </a:ext>
               </a:extLst>
             </p:cNvPr>
@@ -23163,8 +22386,8 @@
           </p:nvSpPr>
           <p:spPr>
             <a:xfrm>
-              <a:off x="7362045" y="6329802"/>
-              <a:ext cx="457937" cy="276999"/>
+              <a:off x="4745158" y="3664081"/>
+              <a:ext cx="378629" cy="200055"/>
             </a:xfrm>
             <a:prstGeom prst="rect">
               <a:avLst/>
@@ -23177,25 +22400,49 @@
             </a:ln>
           </p:spPr>
           <p:txBody>
-            <a:bodyPr wrap="square" rtlCol="0">
+            <a:bodyPr wrap="none" rtlCol="0" anchor="ctr">
               <a:spAutoFit/>
             </a:bodyPr>
             <a:lstStyle/>
             <a:p>
               <a:pPr algn="ctr"/>
               <a:r>
-                <a:rPr lang="en-US" sz="1200" dirty="0"/>
-                <a:t>Jun</a:t>
+                <a:rPr lang="en-US" sz="700" dirty="0"/>
+                <a:t>Stack</a:t>
               </a:r>
             </a:p>
           </p:txBody>
         </p:sp>
+      </p:grpSp>
+      <p:grpSp>
+        <p:nvGrpSpPr>
+          <p:cNvPr id="153" name="Group 152">
+            <a:extLst>
+              <a:ext uri="{FF2B5EF4-FFF2-40B4-BE49-F238E27FC236}">
+                <a16:creationId xmlns:a16="http://schemas.microsoft.com/office/drawing/2014/main" id="{533BC8D8-9197-0932-0EF0-B3A8470FCCD7}"/>
+              </a:ext>
+            </a:extLst>
+          </p:cNvPr>
+          <p:cNvGrpSpPr/>
+          <p:nvPr/>
+        </p:nvGrpSpPr>
+        <p:grpSpPr>
+          <a:xfrm>
+            <a:off x="6171779" y="3236205"/>
+            <a:ext cx="518734" cy="774030"/>
+            <a:chOff x="4745158" y="3090106"/>
+            <a:chExt cx="518734" cy="774030"/>
+          </a:xfrm>
+          <a:solidFill>
+            <a:schemeClr val="bg1"/>
+          </a:solidFill>
+        </p:grpSpPr>
         <p:sp>
           <p:nvSpPr>
-            <p:cNvPr id="120" name="TextBox 119">
+            <p:cNvPr id="154" name="TextBox 153">
               <a:extLst>
                 <a:ext uri="{FF2B5EF4-FFF2-40B4-BE49-F238E27FC236}">
-                  <a16:creationId xmlns:a16="http://schemas.microsoft.com/office/drawing/2014/main" id="{5B567C25-F399-94C2-A4F7-555D202238DC}"/>
+                  <a16:creationId xmlns:a16="http://schemas.microsoft.com/office/drawing/2014/main" id="{CC9AC616-850F-6A47-A856-E32CE42CC28C}"/>
                 </a:ext>
               </a:extLst>
             </p:cNvPr>
@@ -23204,8 +22451,8 @@
           </p:nvSpPr>
           <p:spPr>
             <a:xfrm>
-              <a:off x="7850052" y="6329802"/>
-              <a:ext cx="457937" cy="276999"/>
+              <a:off x="4745158" y="3090106"/>
+              <a:ext cx="410689" cy="200055"/>
             </a:xfrm>
             <a:prstGeom prst="rect">
               <a:avLst/>
@@ -23218,25 +22465,25 @@
             </a:ln>
           </p:spPr>
           <p:txBody>
-            <a:bodyPr wrap="square" rtlCol="0">
+            <a:bodyPr wrap="none" rtlCol="0" anchor="ctr">
               <a:spAutoFit/>
             </a:bodyPr>
             <a:lstStyle/>
             <a:p>
               <a:pPr algn="ctr"/>
               <a:r>
-                <a:rPr lang="en-US" sz="1200" dirty="0"/>
-                <a:t>Jul</a:t>
+                <a:rPr lang="en-US" sz="700" dirty="0"/>
+                <a:t>Swath</a:t>
               </a:r>
             </a:p>
           </p:txBody>
         </p:sp>
         <p:sp>
           <p:nvSpPr>
-            <p:cNvPr id="121" name="TextBox 120">
+            <p:cNvPr id="155" name="TextBox 154">
               <a:extLst>
                 <a:ext uri="{FF2B5EF4-FFF2-40B4-BE49-F238E27FC236}">
-                  <a16:creationId xmlns:a16="http://schemas.microsoft.com/office/drawing/2014/main" id="{BF1C3348-CDCC-3306-0CE6-F259F6DAD012}"/>
+                  <a16:creationId xmlns:a16="http://schemas.microsoft.com/office/drawing/2014/main" id="{3A34AB0A-4C86-5269-DF8B-33C19F13F478}"/>
                 </a:ext>
               </a:extLst>
             </p:cNvPr>
@@ -23245,8 +22492,8 @@
           </p:nvSpPr>
           <p:spPr>
             <a:xfrm>
-              <a:off x="8338059" y="6329802"/>
-              <a:ext cx="457937" cy="276999"/>
+              <a:off x="4745158" y="3284941"/>
+              <a:ext cx="518734" cy="184666"/>
             </a:xfrm>
             <a:prstGeom prst="rect">
               <a:avLst/>
@@ -23259,25 +22506,25 @@
             </a:ln>
           </p:spPr>
           <p:txBody>
-            <a:bodyPr wrap="square" rtlCol="0">
+            <a:bodyPr wrap="square" rtlCol="0" anchor="ctr">
               <a:spAutoFit/>
             </a:bodyPr>
             <a:lstStyle/>
             <a:p>
               <a:pPr algn="ctr"/>
               <a:r>
-                <a:rPr lang="en-US" sz="1200" dirty="0"/>
-                <a:t>Aug</a:t>
+                <a:rPr lang="en-US" sz="600" dirty="0"/>
+                <a:t>Windrow</a:t>
               </a:r>
             </a:p>
           </p:txBody>
         </p:sp>
         <p:sp>
           <p:nvSpPr>
-            <p:cNvPr id="122" name="TextBox 121">
+            <p:cNvPr id="156" name="TextBox 155">
               <a:extLst>
                 <a:ext uri="{FF2B5EF4-FFF2-40B4-BE49-F238E27FC236}">
-                  <a16:creationId xmlns:a16="http://schemas.microsoft.com/office/drawing/2014/main" id="{CF03C7EA-998E-8A70-D63A-5DD28171A839}"/>
+                  <a16:creationId xmlns:a16="http://schemas.microsoft.com/office/drawing/2014/main" id="{7EC225E7-CC00-797E-156B-2B87CD70DD6A}"/>
                 </a:ext>
               </a:extLst>
             </p:cNvPr>
@@ -23286,8 +22533,8 @@
           </p:nvSpPr>
           <p:spPr>
             <a:xfrm>
-              <a:off x="8826066" y="6329802"/>
-              <a:ext cx="457937" cy="276999"/>
+              <a:off x="4745158" y="3468998"/>
+              <a:ext cx="341760" cy="200055"/>
             </a:xfrm>
             <a:prstGeom prst="rect">
               <a:avLst/>
@@ -23300,25 +22547,25 @@
             </a:ln>
           </p:spPr>
           <p:txBody>
-            <a:bodyPr wrap="square" rtlCol="0">
+            <a:bodyPr wrap="none" rtlCol="0" anchor="ctr">
               <a:spAutoFit/>
             </a:bodyPr>
             <a:lstStyle/>
             <a:p>
               <a:pPr algn="ctr"/>
               <a:r>
-                <a:rPr lang="en-US" sz="1200" dirty="0"/>
-                <a:t>Sep</a:t>
+                <a:rPr lang="en-US" sz="700" dirty="0"/>
+                <a:t>Bale</a:t>
               </a:r>
             </a:p>
           </p:txBody>
         </p:sp>
         <p:sp>
           <p:nvSpPr>
-            <p:cNvPr id="123" name="TextBox 122">
+            <p:cNvPr id="157" name="TextBox 156">
               <a:extLst>
                 <a:ext uri="{FF2B5EF4-FFF2-40B4-BE49-F238E27FC236}">
-                  <a16:creationId xmlns:a16="http://schemas.microsoft.com/office/drawing/2014/main" id="{CA6812CE-F65A-F885-F94B-898C6D6A667C}"/>
+                  <a16:creationId xmlns:a16="http://schemas.microsoft.com/office/drawing/2014/main" id="{175E1024-6E7E-AA3D-C5F1-94423D2B8032}"/>
                 </a:ext>
               </a:extLst>
             </p:cNvPr>
@@ -23327,8 +22574,8 @@
           </p:nvSpPr>
           <p:spPr>
             <a:xfrm>
-              <a:off x="9314073" y="6329802"/>
-              <a:ext cx="457937" cy="276999"/>
+              <a:off x="4745158" y="3664081"/>
+              <a:ext cx="378629" cy="200055"/>
             </a:xfrm>
             <a:prstGeom prst="rect">
               <a:avLst/>
@@ -23341,25 +22588,49 @@
             </a:ln>
           </p:spPr>
           <p:txBody>
-            <a:bodyPr wrap="square" rtlCol="0">
+            <a:bodyPr wrap="none" rtlCol="0" anchor="ctr">
               <a:spAutoFit/>
             </a:bodyPr>
             <a:lstStyle/>
             <a:p>
               <a:pPr algn="ctr"/>
               <a:r>
-                <a:rPr lang="en-US" sz="1200" dirty="0"/>
-                <a:t>Oct</a:t>
+                <a:rPr lang="en-US" sz="700" dirty="0"/>
+                <a:t>Stack</a:t>
               </a:r>
             </a:p>
           </p:txBody>
         </p:sp>
+      </p:grpSp>
+      <p:grpSp>
+        <p:nvGrpSpPr>
+          <p:cNvPr id="158" name="Group 157">
+            <a:extLst>
+              <a:ext uri="{FF2B5EF4-FFF2-40B4-BE49-F238E27FC236}">
+                <a16:creationId xmlns:a16="http://schemas.microsoft.com/office/drawing/2014/main" id="{8BDCA48E-10B0-0931-D3BC-9955792037D9}"/>
+              </a:ext>
+            </a:extLst>
+          </p:cNvPr>
+          <p:cNvGrpSpPr/>
+          <p:nvPr/>
+        </p:nvGrpSpPr>
+        <p:grpSpPr>
+          <a:xfrm>
+            <a:off x="6640640" y="3252983"/>
+            <a:ext cx="518734" cy="774030"/>
+            <a:chOff x="4745158" y="3090106"/>
+            <a:chExt cx="518734" cy="774030"/>
+          </a:xfrm>
+          <a:solidFill>
+            <a:schemeClr val="bg1"/>
+          </a:solidFill>
+        </p:grpSpPr>
         <p:sp>
           <p:nvSpPr>
-            <p:cNvPr id="124" name="TextBox 123">
+            <p:cNvPr id="159" name="TextBox 158">
               <a:extLst>
                 <a:ext uri="{FF2B5EF4-FFF2-40B4-BE49-F238E27FC236}">
-                  <a16:creationId xmlns:a16="http://schemas.microsoft.com/office/drawing/2014/main" id="{810D6506-AAF1-3FF1-2928-CD46CAE2D917}"/>
+                  <a16:creationId xmlns:a16="http://schemas.microsoft.com/office/drawing/2014/main" id="{FAE26185-84B8-019B-A13F-587EF8E7AAAF}"/>
                 </a:ext>
               </a:extLst>
             </p:cNvPr>
@@ -23368,8 +22639,8 @@
           </p:nvSpPr>
           <p:spPr>
             <a:xfrm>
-              <a:off x="9802080" y="6329802"/>
-              <a:ext cx="457937" cy="276999"/>
+              <a:off x="4745158" y="3090106"/>
+              <a:ext cx="410689" cy="200055"/>
             </a:xfrm>
             <a:prstGeom prst="rect">
               <a:avLst/>
@@ -23382,25 +22653,25 @@
             </a:ln>
           </p:spPr>
           <p:txBody>
-            <a:bodyPr wrap="square" rtlCol="0">
+            <a:bodyPr wrap="none" rtlCol="0" anchor="ctr">
               <a:spAutoFit/>
             </a:bodyPr>
             <a:lstStyle/>
             <a:p>
               <a:pPr algn="ctr"/>
               <a:r>
-                <a:rPr lang="en-US" sz="1200" dirty="0"/>
-                <a:t>Nov</a:t>
+                <a:rPr lang="en-US" sz="700" dirty="0"/>
+                <a:t>Swath</a:t>
               </a:r>
             </a:p>
           </p:txBody>
         </p:sp>
         <p:sp>
           <p:nvSpPr>
-            <p:cNvPr id="125" name="TextBox 124">
+            <p:cNvPr id="160" name="TextBox 159">
               <a:extLst>
                 <a:ext uri="{FF2B5EF4-FFF2-40B4-BE49-F238E27FC236}">
-                  <a16:creationId xmlns:a16="http://schemas.microsoft.com/office/drawing/2014/main" id="{4A15ACD0-54FB-8B38-EFA2-FDA77FB4976A}"/>
+                  <a16:creationId xmlns:a16="http://schemas.microsoft.com/office/drawing/2014/main" id="{965BFA8C-E75C-46E0-B8EC-580DC0FD7323}"/>
                 </a:ext>
               </a:extLst>
             </p:cNvPr>
@@ -23409,8 +22680,8 @@
           </p:nvSpPr>
           <p:spPr>
             <a:xfrm>
-              <a:off x="10290086" y="6329802"/>
-              <a:ext cx="457937" cy="276999"/>
+              <a:off x="4745158" y="3284941"/>
+              <a:ext cx="518734" cy="184666"/>
             </a:xfrm>
             <a:prstGeom prst="rect">
               <a:avLst/>
@@ -23423,51 +22694,25 @@
             </a:ln>
           </p:spPr>
           <p:txBody>
-            <a:bodyPr wrap="square" rtlCol="0">
+            <a:bodyPr wrap="square" rtlCol="0" anchor="ctr">
               <a:spAutoFit/>
             </a:bodyPr>
             <a:lstStyle/>
             <a:p>
               <a:pPr algn="ctr"/>
               <a:r>
-                <a:rPr lang="en-US" sz="1200" dirty="0"/>
-                <a:t>Dec</a:t>
+                <a:rPr lang="en-US" sz="600" dirty="0"/>
+                <a:t>Windrow</a:t>
               </a:r>
             </a:p>
           </p:txBody>
         </p:sp>
-      </p:grpSp>
-      <p:grpSp>
-        <p:nvGrpSpPr>
-          <p:cNvPr id="126" name="Group 125">
-            <a:extLst>
-              <a:ext uri="{FF2B5EF4-FFF2-40B4-BE49-F238E27FC236}">
-                <a16:creationId xmlns:a16="http://schemas.microsoft.com/office/drawing/2014/main" id="{6E6A46AF-FC21-365D-627A-3CA7B22A7EDC}"/>
-              </a:ext>
-            </a:extLst>
-          </p:cNvPr>
-          <p:cNvGrpSpPr/>
-          <p:nvPr/>
-        </p:nvGrpSpPr>
-        <p:grpSpPr>
-          <a:xfrm>
-            <a:off x="4719798" y="6164668"/>
-            <a:ext cx="5826013" cy="276999"/>
-            <a:chOff x="4922010" y="6329802"/>
-            <a:chExt cx="5826013" cy="276999"/>
-          </a:xfrm>
-          <a:solidFill>
-            <a:schemeClr val="accent6">
-              <a:lumMod val="75000"/>
-            </a:schemeClr>
-          </a:solidFill>
-        </p:grpSpPr>
         <p:sp>
           <p:nvSpPr>
-            <p:cNvPr id="127" name="TextBox 126">
+            <p:cNvPr id="164" name="TextBox 163">
               <a:extLst>
                 <a:ext uri="{FF2B5EF4-FFF2-40B4-BE49-F238E27FC236}">
-                  <a16:creationId xmlns:a16="http://schemas.microsoft.com/office/drawing/2014/main" id="{42DBB199-7105-4205-C253-47715FDE53F4}"/>
+                  <a16:creationId xmlns:a16="http://schemas.microsoft.com/office/drawing/2014/main" id="{712E2450-0556-B767-79F0-6F4C78C670A1}"/>
                 </a:ext>
               </a:extLst>
             </p:cNvPr>
@@ -23476,8 +22721,8 @@
           </p:nvSpPr>
           <p:spPr>
             <a:xfrm>
-              <a:off x="4922010" y="6329802"/>
-              <a:ext cx="457937" cy="276999"/>
+              <a:off x="4745158" y="3468998"/>
+              <a:ext cx="341760" cy="200055"/>
             </a:xfrm>
             <a:prstGeom prst="rect">
               <a:avLst/>
@@ -23490,25 +22735,25 @@
             </a:ln>
           </p:spPr>
           <p:txBody>
-            <a:bodyPr wrap="square" rtlCol="0">
+            <a:bodyPr wrap="none" rtlCol="0" anchor="ctr">
               <a:spAutoFit/>
             </a:bodyPr>
             <a:lstStyle/>
             <a:p>
               <a:pPr algn="ctr"/>
               <a:r>
-                <a:rPr lang="en-US" sz="1200" dirty="0"/>
-                <a:t>Jan</a:t>
+                <a:rPr lang="en-US" sz="700" dirty="0"/>
+                <a:t>Bale</a:t>
               </a:r>
             </a:p>
           </p:txBody>
         </p:sp>
         <p:sp>
           <p:nvSpPr>
-            <p:cNvPr id="128" name="TextBox 127">
+            <p:cNvPr id="165" name="TextBox 164">
               <a:extLst>
                 <a:ext uri="{FF2B5EF4-FFF2-40B4-BE49-F238E27FC236}">
-                  <a16:creationId xmlns:a16="http://schemas.microsoft.com/office/drawing/2014/main" id="{7AAE3A83-148B-2878-F210-972213A4B0A9}"/>
+                  <a16:creationId xmlns:a16="http://schemas.microsoft.com/office/drawing/2014/main" id="{DE1BF7B2-4406-CAD0-9E88-65F11BD7F8F9}"/>
                 </a:ext>
               </a:extLst>
             </p:cNvPr>
@@ -23517,8 +22762,8 @@
           </p:nvSpPr>
           <p:spPr>
             <a:xfrm>
-              <a:off x="5410017" y="6329802"/>
-              <a:ext cx="457937" cy="276999"/>
+              <a:off x="4745158" y="3664081"/>
+              <a:ext cx="378629" cy="200055"/>
             </a:xfrm>
             <a:prstGeom prst="rect">
               <a:avLst/>
@@ -23531,25 +22776,49 @@
             </a:ln>
           </p:spPr>
           <p:txBody>
-            <a:bodyPr wrap="square" rtlCol="0">
+            <a:bodyPr wrap="none" rtlCol="0" anchor="ctr">
               <a:spAutoFit/>
             </a:bodyPr>
             <a:lstStyle/>
             <a:p>
               <a:pPr algn="ctr"/>
               <a:r>
-                <a:rPr lang="en-US" sz="1200" dirty="0"/>
-                <a:t>Feb</a:t>
+                <a:rPr lang="en-US" sz="700" dirty="0"/>
+                <a:t>Stack</a:t>
               </a:r>
             </a:p>
           </p:txBody>
         </p:sp>
+      </p:grpSp>
+      <p:grpSp>
+        <p:nvGrpSpPr>
+          <p:cNvPr id="166" name="Group 165">
+            <a:extLst>
+              <a:ext uri="{FF2B5EF4-FFF2-40B4-BE49-F238E27FC236}">
+                <a16:creationId xmlns:a16="http://schemas.microsoft.com/office/drawing/2014/main" id="{36F11451-B0C8-CCB9-3E1E-725757AB1549}"/>
+              </a:ext>
+            </a:extLst>
+          </p:cNvPr>
+          <p:cNvGrpSpPr/>
+          <p:nvPr/>
+        </p:nvGrpSpPr>
+        <p:grpSpPr>
+          <a:xfrm>
+            <a:off x="7148133" y="3294928"/>
+            <a:ext cx="518734" cy="774030"/>
+            <a:chOff x="4745158" y="3090106"/>
+            <a:chExt cx="518734" cy="774030"/>
+          </a:xfrm>
+          <a:solidFill>
+            <a:schemeClr val="bg1"/>
+          </a:solidFill>
+        </p:grpSpPr>
         <p:sp>
           <p:nvSpPr>
-            <p:cNvPr id="129" name="TextBox 128">
+            <p:cNvPr id="167" name="TextBox 166">
               <a:extLst>
                 <a:ext uri="{FF2B5EF4-FFF2-40B4-BE49-F238E27FC236}">
-                  <a16:creationId xmlns:a16="http://schemas.microsoft.com/office/drawing/2014/main" id="{0B251F57-7D92-8412-4F3A-69E60925D830}"/>
+                  <a16:creationId xmlns:a16="http://schemas.microsoft.com/office/drawing/2014/main" id="{B36FB77D-55AA-A4D5-0DC2-C26B21AED602}"/>
                 </a:ext>
               </a:extLst>
             </p:cNvPr>
@@ -23558,8 +22827,8 @@
           </p:nvSpPr>
           <p:spPr>
             <a:xfrm>
-              <a:off x="5898024" y="6329802"/>
-              <a:ext cx="457937" cy="276999"/>
+              <a:off x="4745158" y="3090106"/>
+              <a:ext cx="410689" cy="200055"/>
             </a:xfrm>
             <a:prstGeom prst="rect">
               <a:avLst/>
@@ -23572,25 +22841,25 @@
             </a:ln>
           </p:spPr>
           <p:txBody>
-            <a:bodyPr wrap="square" rtlCol="0">
+            <a:bodyPr wrap="none" rtlCol="0" anchor="ctr">
               <a:spAutoFit/>
             </a:bodyPr>
             <a:lstStyle/>
             <a:p>
               <a:pPr algn="ctr"/>
               <a:r>
-                <a:rPr lang="en-US" sz="1200" dirty="0"/>
-                <a:t>Mar</a:t>
+                <a:rPr lang="en-US" sz="700" dirty="0"/>
+                <a:t>Swath</a:t>
               </a:r>
             </a:p>
           </p:txBody>
         </p:sp>
         <p:sp>
           <p:nvSpPr>
-            <p:cNvPr id="130" name="TextBox 129">
+            <p:cNvPr id="168" name="TextBox 167">
               <a:extLst>
                 <a:ext uri="{FF2B5EF4-FFF2-40B4-BE49-F238E27FC236}">
-                  <a16:creationId xmlns:a16="http://schemas.microsoft.com/office/drawing/2014/main" id="{3E9D2057-EC5E-3306-C342-B2BB2D70A4D0}"/>
+                  <a16:creationId xmlns:a16="http://schemas.microsoft.com/office/drawing/2014/main" id="{FA1BF959-6408-3C4C-E376-B646CA528537}"/>
                 </a:ext>
               </a:extLst>
             </p:cNvPr>
@@ -23599,8 +22868,8 @@
           </p:nvSpPr>
           <p:spPr>
             <a:xfrm>
-              <a:off x="6386031" y="6329802"/>
-              <a:ext cx="457937" cy="276999"/>
+              <a:off x="4745158" y="3284941"/>
+              <a:ext cx="518734" cy="184666"/>
             </a:xfrm>
             <a:prstGeom prst="rect">
               <a:avLst/>
@@ -23613,25 +22882,25 @@
             </a:ln>
           </p:spPr>
           <p:txBody>
-            <a:bodyPr wrap="square" rtlCol="0">
+            <a:bodyPr wrap="square" rtlCol="0" anchor="ctr">
               <a:spAutoFit/>
             </a:bodyPr>
             <a:lstStyle/>
             <a:p>
               <a:pPr algn="ctr"/>
               <a:r>
-                <a:rPr lang="en-US" sz="1200" dirty="0"/>
-                <a:t>Apr</a:t>
+                <a:rPr lang="en-US" sz="600" dirty="0"/>
+                <a:t>Windrow</a:t>
               </a:r>
             </a:p>
           </p:txBody>
         </p:sp>
         <p:sp>
           <p:nvSpPr>
-            <p:cNvPr id="135" name="TextBox 134">
+            <p:cNvPr id="169" name="TextBox 168">
               <a:extLst>
                 <a:ext uri="{FF2B5EF4-FFF2-40B4-BE49-F238E27FC236}">
-                  <a16:creationId xmlns:a16="http://schemas.microsoft.com/office/drawing/2014/main" id="{41EFF7A8-3BC9-202B-18A9-65EF3780C060}"/>
+                  <a16:creationId xmlns:a16="http://schemas.microsoft.com/office/drawing/2014/main" id="{56451508-7F75-DAFD-C53C-675D4984D45C}"/>
                 </a:ext>
               </a:extLst>
             </p:cNvPr>
@@ -23640,8 +22909,8 @@
           </p:nvSpPr>
           <p:spPr>
             <a:xfrm>
-              <a:off x="6874038" y="6329802"/>
-              <a:ext cx="457937" cy="276999"/>
+              <a:off x="4745158" y="3468998"/>
+              <a:ext cx="341760" cy="200055"/>
             </a:xfrm>
             <a:prstGeom prst="rect">
               <a:avLst/>
@@ -23654,25 +22923,25 @@
             </a:ln>
           </p:spPr>
           <p:txBody>
-            <a:bodyPr wrap="square" rtlCol="0">
+            <a:bodyPr wrap="none" rtlCol="0" anchor="ctr">
               <a:spAutoFit/>
             </a:bodyPr>
             <a:lstStyle/>
             <a:p>
               <a:pPr algn="ctr"/>
               <a:r>
-                <a:rPr lang="en-US" sz="1200" dirty="0"/>
-                <a:t>May</a:t>
+                <a:rPr lang="en-US" sz="700" dirty="0"/>
+                <a:t>Bale</a:t>
               </a:r>
             </a:p>
           </p:txBody>
         </p:sp>
         <p:sp>
           <p:nvSpPr>
-            <p:cNvPr id="136" name="TextBox 135">
+            <p:cNvPr id="170" name="TextBox 169">
               <a:extLst>
                 <a:ext uri="{FF2B5EF4-FFF2-40B4-BE49-F238E27FC236}">
-                  <a16:creationId xmlns:a16="http://schemas.microsoft.com/office/drawing/2014/main" id="{D10E8F93-370E-AEA4-E043-5EFF471B3DDD}"/>
+                  <a16:creationId xmlns:a16="http://schemas.microsoft.com/office/drawing/2014/main" id="{96FBA442-D605-00BE-6C00-B3555165196C}"/>
                 </a:ext>
               </a:extLst>
             </p:cNvPr>
@@ -23681,8 +22950,8 @@
           </p:nvSpPr>
           <p:spPr>
             <a:xfrm>
-              <a:off x="7362045" y="6329802"/>
-              <a:ext cx="457937" cy="276999"/>
+              <a:off x="4745158" y="3664081"/>
+              <a:ext cx="378629" cy="200055"/>
             </a:xfrm>
             <a:prstGeom prst="rect">
               <a:avLst/>
@@ -23695,25 +22964,49 @@
             </a:ln>
           </p:spPr>
           <p:txBody>
-            <a:bodyPr wrap="square" rtlCol="0">
+            <a:bodyPr wrap="none" rtlCol="0" anchor="ctr">
               <a:spAutoFit/>
             </a:bodyPr>
             <a:lstStyle/>
             <a:p>
               <a:pPr algn="ctr"/>
               <a:r>
-                <a:rPr lang="en-US" sz="1200" dirty="0"/>
-                <a:t>Jun</a:t>
+                <a:rPr lang="en-US" sz="700" dirty="0"/>
+                <a:t>Stack</a:t>
               </a:r>
             </a:p>
           </p:txBody>
         </p:sp>
+      </p:grpSp>
+      <p:grpSp>
+        <p:nvGrpSpPr>
+          <p:cNvPr id="171" name="Group 170">
+            <a:extLst>
+              <a:ext uri="{FF2B5EF4-FFF2-40B4-BE49-F238E27FC236}">
+                <a16:creationId xmlns:a16="http://schemas.microsoft.com/office/drawing/2014/main" id="{65D2C74E-B02A-92C0-9DE8-4409EBF82E04}"/>
+              </a:ext>
+            </a:extLst>
+          </p:cNvPr>
+          <p:cNvGrpSpPr/>
+          <p:nvPr/>
+        </p:nvGrpSpPr>
+        <p:grpSpPr>
+          <a:xfrm>
+            <a:off x="8144903" y="3199143"/>
+            <a:ext cx="448880" cy="379503"/>
+            <a:chOff x="4745158" y="3090106"/>
+            <a:chExt cx="448880" cy="379503"/>
+          </a:xfrm>
+          <a:solidFill>
+            <a:schemeClr val="bg1"/>
+          </a:solidFill>
+        </p:grpSpPr>
         <p:sp>
           <p:nvSpPr>
-            <p:cNvPr id="137" name="TextBox 136">
+            <p:cNvPr id="172" name="TextBox 171">
               <a:extLst>
                 <a:ext uri="{FF2B5EF4-FFF2-40B4-BE49-F238E27FC236}">
-                  <a16:creationId xmlns:a16="http://schemas.microsoft.com/office/drawing/2014/main" id="{325FDBB6-5A13-2734-3D38-6F841A5790BE}"/>
+                  <a16:creationId xmlns:a16="http://schemas.microsoft.com/office/drawing/2014/main" id="{8B43E3F4-5769-945D-C866-CD5A948C5416}"/>
                 </a:ext>
               </a:extLst>
             </p:cNvPr>
@@ -23722,8 +23015,8 @@
           </p:nvSpPr>
           <p:spPr>
             <a:xfrm>
-              <a:off x="7850052" y="6329802"/>
-              <a:ext cx="457937" cy="276999"/>
+              <a:off x="4745318" y="3090106"/>
+              <a:ext cx="309701" cy="200055"/>
             </a:xfrm>
             <a:prstGeom prst="rect">
               <a:avLst/>
@@ -23736,25 +23029,25 @@
             </a:ln>
           </p:spPr>
           <p:txBody>
-            <a:bodyPr wrap="square" rtlCol="0">
+            <a:bodyPr wrap="none" rtlCol="0" anchor="ctr">
               <a:spAutoFit/>
             </a:bodyPr>
             <a:lstStyle/>
             <a:p>
               <a:pPr algn="ctr"/>
               <a:r>
-                <a:rPr lang="en-US" sz="1200" dirty="0"/>
-                <a:t>Jul</a:t>
+                <a:rPr lang="en-US" sz="700" dirty="0"/>
+                <a:t>Cut</a:t>
               </a:r>
             </a:p>
           </p:txBody>
         </p:sp>
         <p:sp>
           <p:nvSpPr>
-            <p:cNvPr id="140" name="TextBox 139">
+            <p:cNvPr id="173" name="TextBox 172">
               <a:extLst>
                 <a:ext uri="{FF2B5EF4-FFF2-40B4-BE49-F238E27FC236}">
-                  <a16:creationId xmlns:a16="http://schemas.microsoft.com/office/drawing/2014/main" id="{9120355E-9D38-F544-E3B9-4CF4E6285E78}"/>
+                  <a16:creationId xmlns:a16="http://schemas.microsoft.com/office/drawing/2014/main" id="{47BC85CB-6254-AFD1-2467-AE256475D193}"/>
                 </a:ext>
               </a:extLst>
             </p:cNvPr>
@@ -23763,8 +23056,8 @@
           </p:nvSpPr>
           <p:spPr>
             <a:xfrm>
-              <a:off x="8338059" y="6329802"/>
-              <a:ext cx="457937" cy="276999"/>
+              <a:off x="4745158" y="3269554"/>
+              <a:ext cx="448880" cy="200055"/>
             </a:xfrm>
             <a:prstGeom prst="rect">
               <a:avLst/>
@@ -23777,25 +23070,49 @@
             </a:ln>
           </p:spPr>
           <p:txBody>
-            <a:bodyPr wrap="square" rtlCol="0">
+            <a:bodyPr wrap="square" rtlCol="0" anchor="ctr">
               <a:spAutoFit/>
             </a:bodyPr>
             <a:lstStyle/>
             <a:p>
               <a:pPr algn="ctr"/>
               <a:r>
-                <a:rPr lang="en-US" sz="1200" dirty="0"/>
-                <a:t>Aug</a:t>
+                <a:rPr lang="en-US" sz="700" dirty="0"/>
+                <a:t>Chop</a:t>
               </a:r>
             </a:p>
           </p:txBody>
         </p:sp>
+      </p:grpSp>
+      <p:grpSp>
+        <p:nvGrpSpPr>
+          <p:cNvPr id="174" name="Group 173">
+            <a:extLst>
+              <a:ext uri="{FF2B5EF4-FFF2-40B4-BE49-F238E27FC236}">
+                <a16:creationId xmlns:a16="http://schemas.microsoft.com/office/drawing/2014/main" id="{560CCB69-35BB-D7D2-285C-B1A475909A2C}"/>
+              </a:ext>
+            </a:extLst>
+          </p:cNvPr>
+          <p:cNvGrpSpPr/>
+          <p:nvPr/>
+        </p:nvGrpSpPr>
+        <p:grpSpPr>
+          <a:xfrm>
+            <a:off x="7617441" y="3373095"/>
+            <a:ext cx="518734" cy="774030"/>
+            <a:chOff x="4745158" y="3090106"/>
+            <a:chExt cx="518734" cy="774030"/>
+          </a:xfrm>
+          <a:solidFill>
+            <a:schemeClr val="bg1"/>
+          </a:solidFill>
+        </p:grpSpPr>
         <p:sp>
           <p:nvSpPr>
-            <p:cNvPr id="141" name="TextBox 140">
+            <p:cNvPr id="175" name="TextBox 174">
               <a:extLst>
                 <a:ext uri="{FF2B5EF4-FFF2-40B4-BE49-F238E27FC236}">
-                  <a16:creationId xmlns:a16="http://schemas.microsoft.com/office/drawing/2014/main" id="{3DB0FAED-19D4-377F-EACB-9F7BC49094CC}"/>
+                  <a16:creationId xmlns:a16="http://schemas.microsoft.com/office/drawing/2014/main" id="{5676CAD2-7CE4-3BC0-E2E1-2ABA63112B57}"/>
                 </a:ext>
               </a:extLst>
             </p:cNvPr>
@@ -23804,8 +23121,8 @@
           </p:nvSpPr>
           <p:spPr>
             <a:xfrm>
-              <a:off x="8826066" y="6329802"/>
-              <a:ext cx="457937" cy="276999"/>
+              <a:off x="4745158" y="3090106"/>
+              <a:ext cx="410689" cy="200055"/>
             </a:xfrm>
             <a:prstGeom prst="rect">
               <a:avLst/>
@@ -23818,25 +23135,25 @@
             </a:ln>
           </p:spPr>
           <p:txBody>
-            <a:bodyPr wrap="square" rtlCol="0">
+            <a:bodyPr wrap="none" rtlCol="0" anchor="ctr">
               <a:spAutoFit/>
             </a:bodyPr>
             <a:lstStyle/>
             <a:p>
               <a:pPr algn="ctr"/>
               <a:r>
-                <a:rPr lang="en-US" sz="1200" dirty="0"/>
-                <a:t>Sep</a:t>
+                <a:rPr lang="en-US" sz="700" dirty="0"/>
+                <a:t>Swath</a:t>
               </a:r>
             </a:p>
           </p:txBody>
         </p:sp>
         <p:sp>
           <p:nvSpPr>
-            <p:cNvPr id="142" name="TextBox 141">
+            <p:cNvPr id="176" name="TextBox 175">
               <a:extLst>
                 <a:ext uri="{FF2B5EF4-FFF2-40B4-BE49-F238E27FC236}">
-                  <a16:creationId xmlns:a16="http://schemas.microsoft.com/office/drawing/2014/main" id="{D0A5AD1F-DC20-42DA-18B3-28F55BB48A01}"/>
+                  <a16:creationId xmlns:a16="http://schemas.microsoft.com/office/drawing/2014/main" id="{8628AD6B-E6DA-FBA8-3109-B6E180179A4A}"/>
                 </a:ext>
               </a:extLst>
             </p:cNvPr>
@@ -23845,8 +23162,8 @@
           </p:nvSpPr>
           <p:spPr>
             <a:xfrm>
-              <a:off x="9314073" y="6329802"/>
-              <a:ext cx="457937" cy="276999"/>
+              <a:off x="4745158" y="3284941"/>
+              <a:ext cx="518734" cy="184666"/>
             </a:xfrm>
             <a:prstGeom prst="rect">
               <a:avLst/>
@@ -23859,25 +23176,25 @@
             </a:ln>
           </p:spPr>
           <p:txBody>
-            <a:bodyPr wrap="square" rtlCol="0">
+            <a:bodyPr wrap="square" rtlCol="0" anchor="ctr">
               <a:spAutoFit/>
             </a:bodyPr>
             <a:lstStyle/>
             <a:p>
               <a:pPr algn="ctr"/>
               <a:r>
-                <a:rPr lang="en-US" sz="1200" dirty="0"/>
-                <a:t>Oct</a:t>
+                <a:rPr lang="en-US" sz="600" dirty="0"/>
+                <a:t>Windrow</a:t>
               </a:r>
             </a:p>
           </p:txBody>
         </p:sp>
         <p:sp>
           <p:nvSpPr>
-            <p:cNvPr id="145" name="TextBox 144">
+            <p:cNvPr id="180" name="TextBox 179">
               <a:extLst>
                 <a:ext uri="{FF2B5EF4-FFF2-40B4-BE49-F238E27FC236}">
-                  <a16:creationId xmlns:a16="http://schemas.microsoft.com/office/drawing/2014/main" id="{D57172F9-7329-F031-3DD6-5748A2A84064}"/>
+                  <a16:creationId xmlns:a16="http://schemas.microsoft.com/office/drawing/2014/main" id="{95FCBCBF-4793-7EC1-30A9-8E69B3D6C29E}"/>
                 </a:ext>
               </a:extLst>
             </p:cNvPr>
@@ -23886,8 +23203,8 @@
           </p:nvSpPr>
           <p:spPr>
             <a:xfrm>
-              <a:off x="9802080" y="6329802"/>
-              <a:ext cx="457937" cy="276999"/>
+              <a:off x="4745158" y="3468998"/>
+              <a:ext cx="341760" cy="200055"/>
             </a:xfrm>
             <a:prstGeom prst="rect">
               <a:avLst/>
@@ -23900,25 +23217,25 @@
             </a:ln>
           </p:spPr>
           <p:txBody>
-            <a:bodyPr wrap="square" rtlCol="0">
+            <a:bodyPr wrap="none" rtlCol="0" anchor="ctr">
               <a:spAutoFit/>
             </a:bodyPr>
             <a:lstStyle/>
             <a:p>
               <a:pPr algn="ctr"/>
               <a:r>
-                <a:rPr lang="en-US" sz="1200" dirty="0"/>
-                <a:t>Nov</a:t>
+                <a:rPr lang="en-US" sz="700" dirty="0"/>
+                <a:t>Bale</a:t>
               </a:r>
             </a:p>
           </p:txBody>
         </p:sp>
         <p:sp>
           <p:nvSpPr>
-            <p:cNvPr id="146" name="TextBox 145">
+            <p:cNvPr id="181" name="TextBox 180">
               <a:extLst>
                 <a:ext uri="{FF2B5EF4-FFF2-40B4-BE49-F238E27FC236}">
-                  <a16:creationId xmlns:a16="http://schemas.microsoft.com/office/drawing/2014/main" id="{C6545091-524A-31B0-D211-D87E3ACAD5D5}"/>
+                  <a16:creationId xmlns:a16="http://schemas.microsoft.com/office/drawing/2014/main" id="{30592355-DCF7-E214-5DB8-C2672689560B}"/>
                 </a:ext>
               </a:extLst>
             </p:cNvPr>
@@ -23927,8 +23244,8 @@
           </p:nvSpPr>
           <p:spPr>
             <a:xfrm>
-              <a:off x="10290086" y="6329802"/>
-              <a:ext cx="457937" cy="276999"/>
+              <a:off x="4745158" y="3664081"/>
+              <a:ext cx="378629" cy="200055"/>
             </a:xfrm>
             <a:prstGeom prst="rect">
               <a:avLst/>
@@ -23941,20 +23258,354 @@
             </a:ln>
           </p:spPr>
           <p:txBody>
-            <a:bodyPr wrap="square" rtlCol="0">
+            <a:bodyPr wrap="none" rtlCol="0" anchor="ctr">
               <a:spAutoFit/>
             </a:bodyPr>
             <a:lstStyle/>
             <a:p>
               <a:pPr algn="ctr"/>
               <a:r>
-                <a:rPr lang="en-US" sz="1200" dirty="0"/>
-                <a:t>Dec</a:t>
+                <a:rPr lang="en-US" sz="700" dirty="0"/>
+                <a:t>Stack</a:t>
               </a:r>
             </a:p>
           </p:txBody>
         </p:sp>
       </p:grpSp>
+      <p:sp>
+        <p:nvSpPr>
+          <p:cNvPr id="182" name="TextBox 181">
+            <a:extLst>
+              <a:ext uri="{FF2B5EF4-FFF2-40B4-BE49-F238E27FC236}">
+                <a16:creationId xmlns:a16="http://schemas.microsoft.com/office/drawing/2014/main" id="{99E3B265-859E-8D0E-529C-CADAE822E880}"/>
+              </a:ext>
+            </a:extLst>
+          </p:cNvPr>
+          <p:cNvSpPr txBox="1"/>
+          <p:nvPr/>
+        </p:nvSpPr>
+        <p:spPr>
+          <a:xfrm>
+            <a:off x="3802346" y="1258982"/>
+            <a:ext cx="599844" cy="200055"/>
+          </a:xfrm>
+          <a:prstGeom prst="rect">
+            <a:avLst/>
+          </a:prstGeom>
+          <a:noFill/>
+          <a:ln>
+            <a:solidFill>
+              <a:schemeClr val="tx1"/>
+            </a:solidFill>
+          </a:ln>
+        </p:spPr>
+        <p:txBody>
+          <a:bodyPr wrap="none" rtlCol="0">
+            <a:spAutoFit/>
+          </a:bodyPr>
+          <a:lstStyle/>
+          <a:p>
+            <a:r>
+              <a:rPr lang="en-US" sz="700" dirty="0"/>
+              <a:t>Spike x2 (?)</a:t>
+            </a:r>
+          </a:p>
+        </p:txBody>
+      </p:sp>
+      <p:sp>
+        <p:nvSpPr>
+          <p:cNvPr id="183" name="TextBox 182">
+            <a:extLst>
+              <a:ext uri="{FF2B5EF4-FFF2-40B4-BE49-F238E27FC236}">
+                <a16:creationId xmlns:a16="http://schemas.microsoft.com/office/drawing/2014/main" id="{B9A2B87B-80A0-0856-8680-D953783E680F}"/>
+              </a:ext>
+            </a:extLst>
+          </p:cNvPr>
+          <p:cNvSpPr txBox="1"/>
+          <p:nvPr/>
+        </p:nvSpPr>
+        <p:spPr>
+          <a:xfrm>
+            <a:off x="4024443" y="1520348"/>
+            <a:ext cx="1406154" cy="200055"/>
+          </a:xfrm>
+          <a:prstGeom prst="rect">
+            <a:avLst/>
+          </a:prstGeom>
+          <a:noFill/>
+          <a:ln>
+            <a:solidFill>
+              <a:schemeClr val="tx1"/>
+            </a:solidFill>
+          </a:ln>
+        </p:spPr>
+        <p:txBody>
+          <a:bodyPr wrap="none" rtlCol="0">
+            <a:spAutoFit/>
+          </a:bodyPr>
+          <a:lstStyle/>
+          <a:p>
+            <a:r>
+              <a:rPr lang="en-US" sz="700" dirty="0"/>
+              <a:t>Inject fertilizer (25 gal of 10-34-0)</a:t>
+            </a:r>
+          </a:p>
+        </p:txBody>
+      </p:sp>
+      <p:sp>
+        <p:nvSpPr>
+          <p:cNvPr id="184" name="TextBox 183">
+            <a:extLst>
+              <a:ext uri="{FF2B5EF4-FFF2-40B4-BE49-F238E27FC236}">
+                <a16:creationId xmlns:a16="http://schemas.microsoft.com/office/drawing/2014/main" id="{65AC6187-8C59-8AA7-658B-2BD5D95FB61F}"/>
+              </a:ext>
+            </a:extLst>
+          </p:cNvPr>
+          <p:cNvSpPr txBox="1"/>
+          <p:nvPr/>
+        </p:nvSpPr>
+        <p:spPr>
+          <a:xfrm>
+            <a:off x="4193194" y="1806604"/>
+            <a:ext cx="1127232" cy="200055"/>
+          </a:xfrm>
+          <a:prstGeom prst="rect">
+            <a:avLst/>
+          </a:prstGeom>
+          <a:noFill/>
+          <a:ln>
+            <a:solidFill>
+              <a:schemeClr val="tx1"/>
+            </a:solidFill>
+          </a:ln>
+        </p:spPr>
+        <p:txBody>
+          <a:bodyPr wrap="none" rtlCol="0">
+            <a:spAutoFit/>
+          </a:bodyPr>
+          <a:lstStyle/>
+          <a:p>
+            <a:r>
+              <a:rPr lang="en-US" sz="700" dirty="0"/>
+              <a:t>Weed control (ground) x2</a:t>
+            </a:r>
+          </a:p>
+        </p:txBody>
+      </p:sp>
+      <p:sp>
+        <p:nvSpPr>
+          <p:cNvPr id="185" name="TextBox 184">
+            <a:extLst>
+              <a:ext uri="{FF2B5EF4-FFF2-40B4-BE49-F238E27FC236}">
+                <a16:creationId xmlns:a16="http://schemas.microsoft.com/office/drawing/2014/main" id="{457BAE8E-2335-D6FF-F622-26475B1C6991}"/>
+              </a:ext>
+            </a:extLst>
+          </p:cNvPr>
+          <p:cNvSpPr txBox="1"/>
+          <p:nvPr/>
+        </p:nvSpPr>
+        <p:spPr>
+          <a:xfrm>
+            <a:off x="4385150" y="2077543"/>
+            <a:ext cx="1127232" cy="200055"/>
+          </a:xfrm>
+          <a:prstGeom prst="rect">
+            <a:avLst/>
+          </a:prstGeom>
+          <a:noFill/>
+          <a:ln>
+            <a:solidFill>
+              <a:schemeClr val="tx1"/>
+            </a:solidFill>
+          </a:ln>
+        </p:spPr>
+        <p:txBody>
+          <a:bodyPr wrap="none" rtlCol="0">
+            <a:spAutoFit/>
+          </a:bodyPr>
+          <a:lstStyle/>
+          <a:p>
+            <a:r>
+              <a:rPr lang="en-US" sz="700" dirty="0"/>
+              <a:t>Weed control (ground) x2</a:t>
+            </a:r>
+          </a:p>
+        </p:txBody>
+      </p:sp>
+      <p:sp>
+        <p:nvSpPr>
+          <p:cNvPr id="186" name="TextBox 185">
+            <a:extLst>
+              <a:ext uri="{FF2B5EF4-FFF2-40B4-BE49-F238E27FC236}">
+                <a16:creationId xmlns:a16="http://schemas.microsoft.com/office/drawing/2014/main" id="{D53D82E7-E92D-AA5F-80B4-BD71A523DF6E}"/>
+              </a:ext>
+            </a:extLst>
+          </p:cNvPr>
+          <p:cNvSpPr txBox="1"/>
+          <p:nvPr/>
+        </p:nvSpPr>
+        <p:spPr>
+          <a:xfrm>
+            <a:off x="4571978" y="2331594"/>
+            <a:ext cx="825867" cy="200055"/>
+          </a:xfrm>
+          <a:prstGeom prst="rect">
+            <a:avLst/>
+          </a:prstGeom>
+          <a:noFill/>
+          <a:ln>
+            <a:solidFill>
+              <a:schemeClr val="tx1"/>
+            </a:solidFill>
+          </a:ln>
+        </p:spPr>
+        <p:txBody>
+          <a:bodyPr wrap="none" rtlCol="0">
+            <a:spAutoFit/>
+          </a:bodyPr>
+          <a:lstStyle/>
+          <a:p>
+            <a:r>
+              <a:rPr lang="en-US" sz="700" dirty="0"/>
+              <a:t>Flood irrigate 18x</a:t>
+            </a:r>
+          </a:p>
+        </p:txBody>
+      </p:sp>
+      <p:sp>
+        <p:nvSpPr>
+          <p:cNvPr id="187" name="TextBox 186">
+            <a:extLst>
+              <a:ext uri="{FF2B5EF4-FFF2-40B4-BE49-F238E27FC236}">
+                <a16:creationId xmlns:a16="http://schemas.microsoft.com/office/drawing/2014/main" id="{4A73A2E4-170D-3E80-43B5-66AEC870D154}"/>
+              </a:ext>
+            </a:extLst>
+          </p:cNvPr>
+          <p:cNvSpPr txBox="1"/>
+          <p:nvPr/>
+        </p:nvSpPr>
+        <p:spPr>
+          <a:xfrm>
+            <a:off x="4664151" y="2549107"/>
+            <a:ext cx="963725" cy="200055"/>
+          </a:xfrm>
+          <a:prstGeom prst="rect">
+            <a:avLst/>
+          </a:prstGeom>
+          <a:noFill/>
+          <a:ln>
+            <a:solidFill>
+              <a:schemeClr val="tx1"/>
+            </a:solidFill>
+          </a:ln>
+        </p:spPr>
+        <p:txBody>
+          <a:bodyPr wrap="none" rtlCol="0">
+            <a:spAutoFit/>
+          </a:bodyPr>
+          <a:lstStyle/>
+          <a:p>
+            <a:r>
+              <a:rPr lang="en-US" sz="700" dirty="0"/>
+              <a:t>Insect control (air) x4</a:t>
+            </a:r>
+          </a:p>
+        </p:txBody>
+      </p:sp>
+      <p:sp>
+        <p:nvSpPr>
+          <p:cNvPr id="188" name="TextBox 187">
+            <a:extLst>
+              <a:ext uri="{FF2B5EF4-FFF2-40B4-BE49-F238E27FC236}">
+                <a16:creationId xmlns:a16="http://schemas.microsoft.com/office/drawing/2014/main" id="{B35721A0-6DB3-0769-915A-7DF77161BFE1}"/>
+              </a:ext>
+            </a:extLst>
+          </p:cNvPr>
+          <p:cNvSpPr txBox="1"/>
+          <p:nvPr/>
+        </p:nvSpPr>
+        <p:spPr>
+          <a:xfrm>
+            <a:off x="9476274" y="2923010"/>
+            <a:ext cx="1029449" cy="369332"/>
+          </a:xfrm>
+          <a:prstGeom prst="rect">
+            <a:avLst/>
+          </a:prstGeom>
+          <a:noFill/>
+          <a:ln>
+            <a:solidFill>
+              <a:schemeClr val="bg1"/>
+            </a:solidFill>
+          </a:ln>
+        </p:spPr>
+        <p:txBody>
+          <a:bodyPr wrap="none" rtlCol="0">
+            <a:spAutoFit/>
+          </a:bodyPr>
+          <a:lstStyle/>
+          <a:p>
+            <a:r>
+              <a:rPr lang="en-US" sz="900" i="1" dirty="0">
+                <a:solidFill>
+                  <a:srgbClr val="FF0000"/>
+                </a:solidFill>
+              </a:rPr>
+              <a:t>They say swath 9x</a:t>
+            </a:r>
+          </a:p>
+          <a:p>
+            <a:r>
+              <a:rPr lang="en-US" sz="900" i="1" dirty="0">
+                <a:solidFill>
+                  <a:srgbClr val="FF0000"/>
+                </a:solidFill>
+              </a:rPr>
+              <a:t>Rake 12x</a:t>
+            </a:r>
+          </a:p>
+        </p:txBody>
+      </p:sp>
+      <p:sp>
+        <p:nvSpPr>
+          <p:cNvPr id="189" name="TextBox 188">
+            <a:extLst>
+              <a:ext uri="{FF2B5EF4-FFF2-40B4-BE49-F238E27FC236}">
+                <a16:creationId xmlns:a16="http://schemas.microsoft.com/office/drawing/2014/main" id="{BE3D6581-C6AC-4928-D733-1B9CB2182079}"/>
+              </a:ext>
+            </a:extLst>
+          </p:cNvPr>
+          <p:cNvSpPr txBox="1"/>
+          <p:nvPr/>
+        </p:nvSpPr>
+        <p:spPr>
+          <a:xfrm>
+            <a:off x="9429572" y="5449878"/>
+            <a:ext cx="1061509" cy="200055"/>
+          </a:xfrm>
+          <a:prstGeom prst="rect">
+            <a:avLst/>
+          </a:prstGeom>
+          <a:noFill/>
+          <a:ln>
+            <a:solidFill>
+              <a:schemeClr val="tx1"/>
+            </a:solidFill>
+          </a:ln>
+        </p:spPr>
+        <p:txBody>
+          <a:bodyPr wrap="none" rtlCol="0">
+            <a:spAutoFit/>
+          </a:bodyPr>
+          <a:lstStyle/>
+          <a:p>
+            <a:r>
+              <a:rPr lang="en-US" sz="700" dirty="0"/>
+              <a:t>Terminate stand (how?)</a:t>
+            </a:r>
+          </a:p>
+        </p:txBody>
+      </p:sp>
     </p:spTree>
     <p:extLst>
       <p:ext uri="{BB962C8B-B14F-4D97-AF65-F5344CB8AC3E}">

</xml_diff>

<commit_message>
add imperial valley analyses
</commit_message>
<xml_diff>
--- a/docs/enterprise-budgets/timelines-visual.pptx
+++ b/docs/enterprise-budgets/timelines-visual.pptx
@@ -262,7 +262,7 @@
           <a:p>
             <a:fld id="{36776001-9B75-4AA6-8286-BD4E6E27ADA4}" type="datetimeFigureOut">
               <a:rPr lang="en-US" smtClean="0"/>
-              <a:t>4/26/2023</a:t>
+              <a:t>4/27/2023</a:t>
             </a:fld>
             <a:endParaRPr lang="en-US"/>
           </a:p>
@@ -460,7 +460,7 @@
           <a:p>
             <a:fld id="{36776001-9B75-4AA6-8286-BD4E6E27ADA4}" type="datetimeFigureOut">
               <a:rPr lang="en-US" smtClean="0"/>
-              <a:t>4/26/2023</a:t>
+              <a:t>4/27/2023</a:t>
             </a:fld>
             <a:endParaRPr lang="en-US"/>
           </a:p>
@@ -668,7 +668,7 @@
           <a:p>
             <a:fld id="{36776001-9B75-4AA6-8286-BD4E6E27ADA4}" type="datetimeFigureOut">
               <a:rPr lang="en-US" smtClean="0"/>
-              <a:t>4/26/2023</a:t>
+              <a:t>4/27/2023</a:t>
             </a:fld>
             <a:endParaRPr lang="en-US"/>
           </a:p>
@@ -866,7 +866,7 @@
           <a:p>
             <a:fld id="{36776001-9B75-4AA6-8286-BD4E6E27ADA4}" type="datetimeFigureOut">
               <a:rPr lang="en-US" smtClean="0"/>
-              <a:t>4/26/2023</a:t>
+              <a:t>4/27/2023</a:t>
             </a:fld>
             <a:endParaRPr lang="en-US"/>
           </a:p>
@@ -1141,7 +1141,7 @@
           <a:p>
             <a:fld id="{36776001-9B75-4AA6-8286-BD4E6E27ADA4}" type="datetimeFigureOut">
               <a:rPr lang="en-US" smtClean="0"/>
-              <a:t>4/26/2023</a:t>
+              <a:t>4/27/2023</a:t>
             </a:fld>
             <a:endParaRPr lang="en-US"/>
           </a:p>
@@ -1406,7 +1406,7 @@
           <a:p>
             <a:fld id="{36776001-9B75-4AA6-8286-BD4E6E27ADA4}" type="datetimeFigureOut">
               <a:rPr lang="en-US" smtClean="0"/>
-              <a:t>4/26/2023</a:t>
+              <a:t>4/27/2023</a:t>
             </a:fld>
             <a:endParaRPr lang="en-US"/>
           </a:p>
@@ -1818,7 +1818,7 @@
           <a:p>
             <a:fld id="{36776001-9B75-4AA6-8286-BD4E6E27ADA4}" type="datetimeFigureOut">
               <a:rPr lang="en-US" smtClean="0"/>
-              <a:t>4/26/2023</a:t>
+              <a:t>4/27/2023</a:t>
             </a:fld>
             <a:endParaRPr lang="en-US"/>
           </a:p>
@@ -1959,7 +1959,7 @@
           <a:p>
             <a:fld id="{36776001-9B75-4AA6-8286-BD4E6E27ADA4}" type="datetimeFigureOut">
               <a:rPr lang="en-US" smtClean="0"/>
-              <a:t>4/26/2023</a:t>
+              <a:t>4/27/2023</a:t>
             </a:fld>
             <a:endParaRPr lang="en-US"/>
           </a:p>
@@ -2072,7 +2072,7 @@
           <a:p>
             <a:fld id="{36776001-9B75-4AA6-8286-BD4E6E27ADA4}" type="datetimeFigureOut">
               <a:rPr lang="en-US" smtClean="0"/>
-              <a:t>4/26/2023</a:t>
+              <a:t>4/27/2023</a:t>
             </a:fld>
             <a:endParaRPr lang="en-US"/>
           </a:p>
@@ -2383,7 +2383,7 @@
           <a:p>
             <a:fld id="{36776001-9B75-4AA6-8286-BD4E6E27ADA4}" type="datetimeFigureOut">
               <a:rPr lang="en-US" smtClean="0"/>
-              <a:t>4/26/2023</a:t>
+              <a:t>4/27/2023</a:t>
             </a:fld>
             <a:endParaRPr lang="en-US"/>
           </a:p>
@@ -2671,7 +2671,7 @@
           <a:p>
             <a:fld id="{36776001-9B75-4AA6-8286-BD4E6E27ADA4}" type="datetimeFigureOut">
               <a:rPr lang="en-US" smtClean="0"/>
-              <a:t>4/26/2023</a:t>
+              <a:t>4/27/2023</a:t>
             </a:fld>
             <a:endParaRPr lang="en-US"/>
           </a:p>
@@ -2912,7 +2912,7 @@
           <a:p>
             <a:fld id="{36776001-9B75-4AA6-8286-BD4E6E27ADA4}" type="datetimeFigureOut">
               <a:rPr lang="en-US" smtClean="0"/>
-              <a:t>4/26/2023</a:t>
+              <a:t>4/27/2023</a:t>
             </a:fld>
             <a:endParaRPr lang="en-US"/>
           </a:p>
@@ -20092,7 +20092,7 @@
         <p:spPr>
           <a:xfrm>
             <a:off x="144029" y="966211"/>
-            <a:ext cx="599844" cy="200055"/>
+            <a:ext cx="1342034" cy="200055"/>
           </a:xfrm>
           <a:prstGeom prst="rect">
             <a:avLst/>
@@ -20112,7 +20112,7 @@
           <a:p>
             <a:r>
               <a:rPr lang="en-US" sz="700" dirty="0"/>
-              <a:t>Triplane (?)</a:t>
+              <a:t>Triplane (? Assumed laser level)</a:t>
             </a:r>
           </a:p>
         </p:txBody>
@@ -20132,7 +20132,7 @@
         <p:spPr>
           <a:xfrm>
             <a:off x="177585" y="1196907"/>
-            <a:ext cx="636713" cy="200055"/>
+            <a:ext cx="1532792" cy="200055"/>
           </a:xfrm>
           <a:prstGeom prst="rect">
             <a:avLst/>
@@ -20151,12 +20151,8 @@
           <a:lstStyle/>
           <a:p>
             <a:r>
-              <a:rPr lang="en-US" sz="700" dirty="0" err="1"/>
-              <a:t>Corugate</a:t>
-            </a:r>
-            <a:r>
               <a:rPr lang="en-US" sz="700" dirty="0"/>
-              <a:t> (?)</a:t>
+              <a:t>Corrugate (assumed making 8” beds)</a:t>
             </a:r>
           </a:p>
         </p:txBody>
@@ -21276,7 +21272,7 @@
         </p:nvSpPr>
         <p:spPr>
           <a:xfrm>
-            <a:off x="1462989" y="943716"/>
+            <a:off x="1802947" y="528944"/>
             <a:ext cx="1685077" cy="369332"/>
           </a:xfrm>
           <a:prstGeom prst="rect">
@@ -21371,7 +21367,7 @@
         <p:spPr>
           <a:xfrm>
             <a:off x="446722" y="2351696"/>
-            <a:ext cx="482824" cy="200055"/>
+            <a:ext cx="599844" cy="200055"/>
           </a:xfrm>
           <a:prstGeom prst="rect">
             <a:avLst/>
@@ -21391,7 +21387,7 @@
           <a:p>
             <a:r>
               <a:rPr lang="en-US" sz="700" dirty="0"/>
-              <a:t>Triplane</a:t>
+              <a:t>Triplane (?)</a:t>
             </a:r>
           </a:p>
         </p:txBody>
@@ -21411,7 +21407,7 @@
         <p:spPr>
           <a:xfrm>
             <a:off x="502461" y="2593525"/>
-            <a:ext cx="426720" cy="200055"/>
+            <a:ext cx="1481496" cy="200055"/>
           </a:xfrm>
           <a:prstGeom prst="rect">
             <a:avLst/>
@@ -21431,7 +21427,7 @@
           <a:p>
             <a:r>
               <a:rPr lang="en-US" sz="700" dirty="0"/>
-              <a:t>List (?)</a:t>
+              <a:t>List (? Assumed another laser level)</a:t>
             </a:r>
           </a:p>
         </p:txBody>
@@ -23287,7 +23283,7 @@
         <p:spPr>
           <a:xfrm>
             <a:off x="3802346" y="1258982"/>
-            <a:ext cx="599844" cy="200055"/>
+            <a:ext cx="974947" cy="200055"/>
           </a:xfrm>
           <a:prstGeom prst="rect">
             <a:avLst/>
@@ -23307,8 +23303,13 @@
           <a:p>
             <a:r>
               <a:rPr lang="en-US" sz="700" dirty="0"/>
-              <a:t>Spike x2 (?)</a:t>
-            </a:r>
+              <a:t>Spike x2 </a:t>
+            </a:r>
+            <a:r>
+              <a:rPr lang="en-US" sz="700"/>
+              <a:t>(harrowing?)</a:t>
+            </a:r>
+            <a:endParaRPr lang="en-US" sz="700" dirty="0"/>
           </a:p>
         </p:txBody>
       </p:sp>

</xml_diff>